<commit_message>
#Update plan with table
</commit_message>
<xml_diff>
--- a/tool_tier3_docs/sreens.pptx
+++ b/tool_tier3_docs/sreens.pptx
@@ -256,7 +256,7 @@
           <a:p>
             <a:fld id="{3F95A33F-0BE4-4972-96C4-351B17A890F5}" type="datetimeFigureOut">
               <a:rPr lang="en-US" smtClean="0"/>
-              <a:t>1/14/2019</a:t>
+              <a:t>01/14/2019</a:t>
             </a:fld>
             <a:endParaRPr lang="en-US"/>
           </a:p>
@@ -424,7 +424,7 @@
           <a:p>
             <a:fld id="{3F95A33F-0BE4-4972-96C4-351B17A890F5}" type="datetimeFigureOut">
               <a:rPr lang="en-US" smtClean="0"/>
-              <a:t>1/14/2019</a:t>
+              <a:t>01/14/2019</a:t>
             </a:fld>
             <a:endParaRPr lang="en-US"/>
           </a:p>
@@ -602,7 +602,7 @@
           <a:p>
             <a:fld id="{3F95A33F-0BE4-4972-96C4-351B17A890F5}" type="datetimeFigureOut">
               <a:rPr lang="en-US" smtClean="0"/>
-              <a:t>1/14/2019</a:t>
+              <a:t>01/14/2019</a:t>
             </a:fld>
             <a:endParaRPr lang="en-US"/>
           </a:p>
@@ -770,7 +770,7 @@
           <a:p>
             <a:fld id="{3F95A33F-0BE4-4972-96C4-351B17A890F5}" type="datetimeFigureOut">
               <a:rPr lang="en-US" smtClean="0"/>
-              <a:t>1/14/2019</a:t>
+              <a:t>01/14/2019</a:t>
             </a:fld>
             <a:endParaRPr lang="en-US"/>
           </a:p>
@@ -1015,7 +1015,7 @@
           <a:p>
             <a:fld id="{3F95A33F-0BE4-4972-96C4-351B17A890F5}" type="datetimeFigureOut">
               <a:rPr lang="en-US" smtClean="0"/>
-              <a:t>1/14/2019</a:t>
+              <a:t>01/14/2019</a:t>
             </a:fld>
             <a:endParaRPr lang="en-US"/>
           </a:p>
@@ -1244,7 +1244,7 @@
           <a:p>
             <a:fld id="{3F95A33F-0BE4-4972-96C4-351B17A890F5}" type="datetimeFigureOut">
               <a:rPr lang="en-US" smtClean="0"/>
-              <a:t>1/14/2019</a:t>
+              <a:t>01/14/2019</a:t>
             </a:fld>
             <a:endParaRPr lang="en-US"/>
           </a:p>
@@ -1608,7 +1608,7 @@
           <a:p>
             <a:fld id="{3F95A33F-0BE4-4972-96C4-351B17A890F5}" type="datetimeFigureOut">
               <a:rPr lang="en-US" smtClean="0"/>
-              <a:t>1/14/2019</a:t>
+              <a:t>01/14/2019</a:t>
             </a:fld>
             <a:endParaRPr lang="en-US"/>
           </a:p>
@@ -1725,7 +1725,7 @@
           <a:p>
             <a:fld id="{3F95A33F-0BE4-4972-96C4-351B17A890F5}" type="datetimeFigureOut">
               <a:rPr lang="en-US" smtClean="0"/>
-              <a:t>1/14/2019</a:t>
+              <a:t>01/14/2019</a:t>
             </a:fld>
             <a:endParaRPr lang="en-US"/>
           </a:p>
@@ -1820,7 +1820,7 @@
           <a:p>
             <a:fld id="{3F95A33F-0BE4-4972-96C4-351B17A890F5}" type="datetimeFigureOut">
               <a:rPr lang="en-US" smtClean="0"/>
-              <a:t>1/14/2019</a:t>
+              <a:t>01/14/2019</a:t>
             </a:fld>
             <a:endParaRPr lang="en-US"/>
           </a:p>
@@ -2095,7 +2095,7 @@
           <a:p>
             <a:fld id="{3F95A33F-0BE4-4972-96C4-351B17A890F5}" type="datetimeFigureOut">
               <a:rPr lang="en-US" smtClean="0"/>
-              <a:t>1/14/2019</a:t>
+              <a:t>01/14/2019</a:t>
             </a:fld>
             <a:endParaRPr lang="en-US"/>
           </a:p>
@@ -2347,7 +2347,7 @@
           <a:p>
             <a:fld id="{3F95A33F-0BE4-4972-96C4-351B17A890F5}" type="datetimeFigureOut">
               <a:rPr lang="en-US" smtClean="0"/>
-              <a:t>1/14/2019</a:t>
+              <a:t>01/14/2019</a:t>
             </a:fld>
             <a:endParaRPr lang="en-US"/>
           </a:p>
@@ -2558,7 +2558,7 @@
           <a:p>
             <a:fld id="{3F95A33F-0BE4-4972-96C4-351B17A890F5}" type="datetimeFigureOut">
               <a:rPr lang="en-US" smtClean="0"/>
-              <a:t>1/14/2019</a:t>
+              <a:t>01/14/2019</a:t>
             </a:fld>
             <a:endParaRPr lang="en-US"/>
           </a:p>
@@ -16205,7 +16205,7 @@
         </p:nvSpPr>
         <p:spPr>
           <a:xfrm>
-            <a:off x="3291608" y="1236725"/>
+            <a:off x="3364768" y="1237251"/>
             <a:ext cx="1324426" cy="332193"/>
           </a:xfrm>
           <a:prstGeom prst="rect">
@@ -16252,7 +16252,7 @@
         </p:nvSpPr>
         <p:spPr>
           <a:xfrm>
-            <a:off x="3291607" y="2004881"/>
+            <a:off x="3349530" y="1990374"/>
             <a:ext cx="1330255" cy="360802"/>
           </a:xfrm>
           <a:prstGeom prst="rect">
@@ -16299,7 +16299,7 @@
         </p:nvSpPr>
         <p:spPr>
           <a:xfrm>
-            <a:off x="3303263" y="2494122"/>
+            <a:off x="3367681" y="2491865"/>
             <a:ext cx="1318599" cy="375213"/>
           </a:xfrm>
           <a:prstGeom prst="rect">
@@ -16664,7 +16664,7 @@
         </p:nvSpPr>
         <p:spPr>
           <a:xfrm>
-            <a:off x="4856920" y="2017885"/>
+            <a:off x="4870093" y="1980072"/>
             <a:ext cx="1184945" cy="347506"/>
           </a:xfrm>
           <a:prstGeom prst="rect">
@@ -16752,7 +16752,7 @@
         </p:nvSpPr>
         <p:spPr>
           <a:xfrm>
-            <a:off x="4840728" y="2520390"/>
+            <a:off x="4867076" y="2519136"/>
             <a:ext cx="1201137" cy="331314"/>
           </a:xfrm>
           <a:prstGeom prst="rect">

</xml_diff>

<commit_message>
#Update done tables of filters
</commit_message>
<xml_diff>
--- a/tool_tier3_docs/sreens.pptx
+++ b/tool_tier3_docs/sreens.pptx
@@ -256,7 +256,7 @@
           <a:p>
             <a:fld id="{3F95A33F-0BE4-4972-96C4-351B17A890F5}" type="datetimeFigureOut">
               <a:rPr lang="en-US" smtClean="0"/>
-              <a:t>01/14/2019</a:t>
+              <a:t>1/15/2019</a:t>
             </a:fld>
             <a:endParaRPr lang="en-US"/>
           </a:p>
@@ -424,7 +424,7 @@
           <a:p>
             <a:fld id="{3F95A33F-0BE4-4972-96C4-351B17A890F5}" type="datetimeFigureOut">
               <a:rPr lang="en-US" smtClean="0"/>
-              <a:t>01/14/2019</a:t>
+              <a:t>1/15/2019</a:t>
             </a:fld>
             <a:endParaRPr lang="en-US"/>
           </a:p>
@@ -602,7 +602,7 @@
           <a:p>
             <a:fld id="{3F95A33F-0BE4-4972-96C4-351B17A890F5}" type="datetimeFigureOut">
               <a:rPr lang="en-US" smtClean="0"/>
-              <a:t>01/14/2019</a:t>
+              <a:t>1/15/2019</a:t>
             </a:fld>
             <a:endParaRPr lang="en-US"/>
           </a:p>
@@ -770,7 +770,7 @@
           <a:p>
             <a:fld id="{3F95A33F-0BE4-4972-96C4-351B17A890F5}" type="datetimeFigureOut">
               <a:rPr lang="en-US" smtClean="0"/>
-              <a:t>01/14/2019</a:t>
+              <a:t>1/15/2019</a:t>
             </a:fld>
             <a:endParaRPr lang="en-US"/>
           </a:p>
@@ -1015,7 +1015,7 @@
           <a:p>
             <a:fld id="{3F95A33F-0BE4-4972-96C4-351B17A890F5}" type="datetimeFigureOut">
               <a:rPr lang="en-US" smtClean="0"/>
-              <a:t>01/14/2019</a:t>
+              <a:t>1/15/2019</a:t>
             </a:fld>
             <a:endParaRPr lang="en-US"/>
           </a:p>
@@ -1244,7 +1244,7 @@
           <a:p>
             <a:fld id="{3F95A33F-0BE4-4972-96C4-351B17A890F5}" type="datetimeFigureOut">
               <a:rPr lang="en-US" smtClean="0"/>
-              <a:t>01/14/2019</a:t>
+              <a:t>1/15/2019</a:t>
             </a:fld>
             <a:endParaRPr lang="en-US"/>
           </a:p>
@@ -1608,7 +1608,7 @@
           <a:p>
             <a:fld id="{3F95A33F-0BE4-4972-96C4-351B17A890F5}" type="datetimeFigureOut">
               <a:rPr lang="en-US" smtClean="0"/>
-              <a:t>01/14/2019</a:t>
+              <a:t>1/15/2019</a:t>
             </a:fld>
             <a:endParaRPr lang="en-US"/>
           </a:p>
@@ -1725,7 +1725,7 @@
           <a:p>
             <a:fld id="{3F95A33F-0BE4-4972-96C4-351B17A890F5}" type="datetimeFigureOut">
               <a:rPr lang="en-US" smtClean="0"/>
-              <a:t>01/14/2019</a:t>
+              <a:t>1/15/2019</a:t>
             </a:fld>
             <a:endParaRPr lang="en-US"/>
           </a:p>
@@ -1820,7 +1820,7 @@
           <a:p>
             <a:fld id="{3F95A33F-0BE4-4972-96C4-351B17A890F5}" type="datetimeFigureOut">
               <a:rPr lang="en-US" smtClean="0"/>
-              <a:t>01/14/2019</a:t>
+              <a:t>1/15/2019</a:t>
             </a:fld>
             <a:endParaRPr lang="en-US"/>
           </a:p>
@@ -2095,7 +2095,7 @@
           <a:p>
             <a:fld id="{3F95A33F-0BE4-4972-96C4-351B17A890F5}" type="datetimeFigureOut">
               <a:rPr lang="en-US" smtClean="0"/>
-              <a:t>01/14/2019</a:t>
+              <a:t>1/15/2019</a:t>
             </a:fld>
             <a:endParaRPr lang="en-US"/>
           </a:p>
@@ -2347,7 +2347,7 @@
           <a:p>
             <a:fld id="{3F95A33F-0BE4-4972-96C4-351B17A890F5}" type="datetimeFigureOut">
               <a:rPr lang="en-US" smtClean="0"/>
-              <a:t>01/14/2019</a:t>
+              <a:t>1/15/2019</a:t>
             </a:fld>
             <a:endParaRPr lang="en-US"/>
           </a:p>
@@ -2558,7 +2558,7 @@
           <a:p>
             <a:fld id="{3F95A33F-0BE4-4972-96C4-351B17A890F5}" type="datetimeFigureOut">
               <a:rPr lang="en-US" smtClean="0"/>
-              <a:t>01/14/2019</a:t>
+              <a:t>1/15/2019</a:t>
             </a:fld>
             <a:endParaRPr lang="en-US"/>
           </a:p>
@@ -3412,7 +3412,7 @@
             <a:pPr algn="ctr"/>
             <a:r>
               <a:rPr lang="en-US"/>
-              <a:t>Client</a:t>
+              <a:t>Clients</a:t>
             </a:r>
           </a:p>
         </p:txBody>
@@ -3459,7 +3459,7 @@
             <a:pPr algn="ctr"/>
             <a:r>
               <a:rPr lang="en-US"/>
-              <a:t>Authorization</a:t>
+              <a:t>Authorizations</a:t>
             </a:r>
           </a:p>
         </p:txBody>
@@ -3929,7 +3929,7 @@
             <a:pPr algn="ctr"/>
             <a:r>
               <a:rPr lang="en-US"/>
-              <a:t>TL</a:t>
+              <a:t>CT_MAP</a:t>
             </a:r>
           </a:p>
         </p:txBody>
@@ -4066,7 +4066,7 @@
             <a:pPr algn="ctr"/>
             <a:r>
               <a:rPr lang="en-US"/>
-              <a:t>TL</a:t>
+              <a:t>JASA</a:t>
             </a:r>
           </a:p>
         </p:txBody>
@@ -5378,7 +5378,7 @@
             <a:pPr algn="ctr"/>
             <a:r>
               <a:rPr lang="en-US"/>
-              <a:t>Authorization</a:t>
+              <a:t>Authorizations</a:t>
             </a:r>
           </a:p>
         </p:txBody>
@@ -5425,7 +5425,7 @@
             <a:pPr algn="ctr"/>
             <a:r>
               <a:rPr lang="en-US"/>
-              <a:t>Client</a:t>
+              <a:t>Clients</a:t>
             </a:r>
           </a:p>
         </p:txBody>
@@ -5895,7 +5895,7 @@
             <a:pPr algn="ctr"/>
             <a:r>
               <a:rPr lang="en-US"/>
-              <a:t>TL</a:t>
+              <a:t>CT_MAP</a:t>
             </a:r>
           </a:p>
         </p:txBody>
@@ -6032,7 +6032,7 @@
             <a:pPr algn="ctr"/>
             <a:r>
               <a:rPr lang="en-US"/>
-              <a:t>Home Health</a:t>
+              <a:t>JASA</a:t>
             </a:r>
           </a:p>
         </p:txBody>
@@ -6694,7 +6694,7 @@
           <p:nvPr>
             <p:extLst>
               <p:ext uri="{D42A27DB-BD31-4B8C-83A1-F6EECF244321}">
-                <p14:modId xmlns:p14="http://schemas.microsoft.com/office/powerpoint/2010/main" val="4244250317"/>
+                <p14:modId xmlns:p14="http://schemas.microsoft.com/office/powerpoint/2010/main" val="2996611486"/>
               </p:ext>
             </p:extLst>
           </p:nvPr>
@@ -7076,7 +7076,7 @@
                     <a:p>
                       <a:r>
                         <a:rPr lang="en-US" sz="1400"/>
-                        <a:t>12345</a:t>
+                        <a:t>DF</a:t>
                       </a:r>
                     </a:p>
                   </a:txBody>
@@ -8017,20 +8017,20 @@
       </p:grpSpPr>
       <p:sp>
         <p:nvSpPr>
-          <p:cNvPr id="6" name="Rectangle 5">
-            <a:extLst>
-              <a:ext uri="{FF2B5EF4-FFF2-40B4-BE49-F238E27FC236}">
-                <a16:creationId xmlns:a16="http://schemas.microsoft.com/office/drawing/2014/main" id="{DF2B91E9-EED4-4DD8-9263-1C184BC2C671}"/>
-              </a:ext>
-            </a:extLst>
-          </p:cNvPr>
-          <p:cNvSpPr/>
-          <p:nvPr/>
-        </p:nvSpPr>
-        <p:spPr>
-          <a:xfrm>
-            <a:off x="323272" y="1237673"/>
-            <a:ext cx="1380915" cy="338266"/>
+          <p:cNvPr id="7" name="Rectangle 6">
+            <a:extLst>
+              <a:ext uri="{FF2B5EF4-FFF2-40B4-BE49-F238E27FC236}">
+                <a16:creationId xmlns:a16="http://schemas.microsoft.com/office/drawing/2014/main" id="{D6BAFB21-A5ED-4D97-A21B-7037E5B62055}"/>
+              </a:ext>
+            </a:extLst>
+          </p:cNvPr>
+          <p:cNvSpPr/>
+          <p:nvPr/>
+        </p:nvSpPr>
+        <p:spPr>
+          <a:xfrm>
+            <a:off x="323272" y="1716827"/>
+            <a:ext cx="1590966" cy="338266"/>
           </a:xfrm>
           <a:prstGeom prst="rect">
             <a:avLst/>
@@ -8057,27 +8057,27 @@
             <a:pPr algn="ctr"/>
             <a:r>
               <a:rPr lang="en-US" sz="1400"/>
-              <a:t>Jurisdiction</a:t>
-            </a:r>
-          </a:p>
-        </p:txBody>
-      </p:sp>
-      <p:sp>
-        <p:nvSpPr>
-          <p:cNvPr id="7" name="Rectangle 6">
-            <a:extLst>
-              <a:ext uri="{FF2B5EF4-FFF2-40B4-BE49-F238E27FC236}">
-                <a16:creationId xmlns:a16="http://schemas.microsoft.com/office/drawing/2014/main" id="{D6BAFB21-A5ED-4D97-A21B-7037E5B62055}"/>
-              </a:ext>
-            </a:extLst>
-          </p:cNvPr>
-          <p:cNvSpPr/>
-          <p:nvPr/>
-        </p:nvSpPr>
-        <p:spPr>
-          <a:xfrm>
-            <a:off x="323273" y="1716827"/>
-            <a:ext cx="1380914" cy="338266"/>
+              <a:t>First name</a:t>
+            </a:r>
+          </a:p>
+        </p:txBody>
+      </p:sp>
+      <p:sp>
+        <p:nvSpPr>
+          <p:cNvPr id="8" name="Rectangle 7">
+            <a:extLst>
+              <a:ext uri="{FF2B5EF4-FFF2-40B4-BE49-F238E27FC236}">
+                <a16:creationId xmlns:a16="http://schemas.microsoft.com/office/drawing/2014/main" id="{6676BFCD-4CA3-4401-B454-D77FF8A98A72}"/>
+              </a:ext>
+            </a:extLst>
+          </p:cNvPr>
+          <p:cNvSpPr/>
+          <p:nvPr/>
+        </p:nvSpPr>
+        <p:spPr>
+          <a:xfrm>
+            <a:off x="323272" y="2219609"/>
+            <a:ext cx="1590966" cy="338266"/>
           </a:xfrm>
           <a:prstGeom prst="rect">
             <a:avLst/>
@@ -8104,27 +8104,27 @@
             <a:pPr algn="ctr"/>
             <a:r>
               <a:rPr lang="en-US" sz="1400"/>
-              <a:t>First name</a:t>
-            </a:r>
-          </a:p>
-        </p:txBody>
-      </p:sp>
-      <p:sp>
-        <p:nvSpPr>
-          <p:cNvPr id="8" name="Rectangle 7">
-            <a:extLst>
-              <a:ext uri="{FF2B5EF4-FFF2-40B4-BE49-F238E27FC236}">
-                <a16:creationId xmlns:a16="http://schemas.microsoft.com/office/drawing/2014/main" id="{6676BFCD-4CA3-4401-B454-D77FF8A98A72}"/>
-              </a:ext>
-            </a:extLst>
-          </p:cNvPr>
-          <p:cNvSpPr/>
-          <p:nvPr/>
-        </p:nvSpPr>
-        <p:spPr>
-          <a:xfrm>
-            <a:off x="323272" y="2219609"/>
-            <a:ext cx="1380914" cy="338266"/>
+              <a:t>Patient ID</a:t>
+            </a:r>
+          </a:p>
+        </p:txBody>
+      </p:sp>
+      <p:sp>
+        <p:nvSpPr>
+          <p:cNvPr id="9" name="Rectangle 8">
+            <a:extLst>
+              <a:ext uri="{FF2B5EF4-FFF2-40B4-BE49-F238E27FC236}">
+                <a16:creationId xmlns:a16="http://schemas.microsoft.com/office/drawing/2014/main" id="{4C36CCE1-27C2-47E1-BDE9-A914861A542A}"/>
+              </a:ext>
+            </a:extLst>
+          </p:cNvPr>
+          <p:cNvSpPr/>
+          <p:nvPr/>
+        </p:nvSpPr>
+        <p:spPr>
+          <a:xfrm>
+            <a:off x="305512" y="4486783"/>
+            <a:ext cx="1590966" cy="338266"/>
           </a:xfrm>
           <a:prstGeom prst="rect">
             <a:avLst/>
@@ -8151,27 +8151,27 @@
             <a:pPr algn="ctr"/>
             <a:r>
               <a:rPr lang="en-US" sz="1400"/>
-              <a:t>Client ID</a:t>
-            </a:r>
-          </a:p>
-        </p:txBody>
-      </p:sp>
-      <p:sp>
-        <p:nvSpPr>
-          <p:cNvPr id="9" name="Rectangle 8">
-            <a:extLst>
-              <a:ext uri="{FF2B5EF4-FFF2-40B4-BE49-F238E27FC236}">
-                <a16:creationId xmlns:a16="http://schemas.microsoft.com/office/drawing/2014/main" id="{4C36CCE1-27C2-47E1-BDE9-A914861A542A}"/>
-              </a:ext>
-            </a:extLst>
-          </p:cNvPr>
-          <p:cNvSpPr/>
-          <p:nvPr/>
-        </p:nvSpPr>
-        <p:spPr>
-          <a:xfrm>
-            <a:off x="305512" y="4486783"/>
-            <a:ext cx="1380914" cy="338266"/>
+              <a:t>To</a:t>
+            </a:r>
+          </a:p>
+        </p:txBody>
+      </p:sp>
+      <p:sp>
+        <p:nvSpPr>
+          <p:cNvPr id="10" name="Rectangle 9">
+            <a:extLst>
+              <a:ext uri="{FF2B5EF4-FFF2-40B4-BE49-F238E27FC236}">
+                <a16:creationId xmlns:a16="http://schemas.microsoft.com/office/drawing/2014/main" id="{843BE703-94CE-4448-B367-F5DBE92E5A21}"/>
+              </a:ext>
+            </a:extLst>
+          </p:cNvPr>
+          <p:cNvSpPr/>
+          <p:nvPr/>
+        </p:nvSpPr>
+        <p:spPr>
+          <a:xfrm>
+            <a:off x="305512" y="3945875"/>
+            <a:ext cx="1590966" cy="338266"/>
           </a:xfrm>
           <a:prstGeom prst="rect">
             <a:avLst/>
@@ -8198,27 +8198,27 @@
             <a:pPr algn="ctr"/>
             <a:r>
               <a:rPr lang="en-US" sz="1400"/>
-              <a:t>To</a:t>
-            </a:r>
-          </a:p>
-        </p:txBody>
-      </p:sp>
-      <p:sp>
-        <p:nvSpPr>
-          <p:cNvPr id="10" name="Rectangle 9">
-            <a:extLst>
-              <a:ext uri="{FF2B5EF4-FFF2-40B4-BE49-F238E27FC236}">
-                <a16:creationId xmlns:a16="http://schemas.microsoft.com/office/drawing/2014/main" id="{843BE703-94CE-4448-B367-F5DBE92E5A21}"/>
-              </a:ext>
-            </a:extLst>
-          </p:cNvPr>
-          <p:cNvSpPr/>
-          <p:nvPr/>
-        </p:nvSpPr>
-        <p:spPr>
-          <a:xfrm>
-            <a:off x="305512" y="3945875"/>
-            <a:ext cx="1380914" cy="338266"/>
+              <a:t>From</a:t>
+            </a:r>
+          </a:p>
+        </p:txBody>
+      </p:sp>
+      <p:sp>
+        <p:nvSpPr>
+          <p:cNvPr id="11" name="Rectangle 10">
+            <a:extLst>
+              <a:ext uri="{FF2B5EF4-FFF2-40B4-BE49-F238E27FC236}">
+                <a16:creationId xmlns:a16="http://schemas.microsoft.com/office/drawing/2014/main" id="{C7FF2387-9D28-4BCA-9A73-D405644BC1C1}"/>
+              </a:ext>
+            </a:extLst>
+          </p:cNvPr>
+          <p:cNvSpPr/>
+          <p:nvPr/>
+        </p:nvSpPr>
+        <p:spPr>
+          <a:xfrm>
+            <a:off x="323272" y="1228343"/>
+            <a:ext cx="1590966" cy="375213"/>
           </a:xfrm>
           <a:prstGeom prst="rect">
             <a:avLst/>
@@ -8245,27 +8245,27 @@
             <a:pPr algn="ctr"/>
             <a:r>
               <a:rPr lang="en-US" sz="1400"/>
-              <a:t>From</a:t>
-            </a:r>
-          </a:p>
-        </p:txBody>
-      </p:sp>
-      <p:sp>
-        <p:nvSpPr>
-          <p:cNvPr id="11" name="Rectangle 10">
-            <a:extLst>
-              <a:ext uri="{FF2B5EF4-FFF2-40B4-BE49-F238E27FC236}">
-                <a16:creationId xmlns:a16="http://schemas.microsoft.com/office/drawing/2014/main" id="{C7FF2387-9D28-4BCA-9A73-D405644BC1C1}"/>
-              </a:ext>
-            </a:extLst>
-          </p:cNvPr>
-          <p:cNvSpPr/>
-          <p:nvPr/>
-        </p:nvSpPr>
-        <p:spPr>
-          <a:xfrm>
-            <a:off x="5631870" y="1200724"/>
-            <a:ext cx="1590966" cy="375213"/>
+              <a:t>Agency</a:t>
+            </a:r>
+          </a:p>
+        </p:txBody>
+      </p:sp>
+      <p:sp>
+        <p:nvSpPr>
+          <p:cNvPr id="12" name="Rectangle 11">
+            <a:extLst>
+              <a:ext uri="{FF2B5EF4-FFF2-40B4-BE49-F238E27FC236}">
+                <a16:creationId xmlns:a16="http://schemas.microsoft.com/office/drawing/2014/main" id="{3CCD1C28-5DF6-44EB-920C-EC57152A0D8B}"/>
+              </a:ext>
+            </a:extLst>
+          </p:cNvPr>
+          <p:cNvSpPr/>
+          <p:nvPr/>
+        </p:nvSpPr>
+        <p:spPr>
+          <a:xfrm>
+            <a:off x="5631868" y="1692300"/>
+            <a:ext cx="1590968" cy="375213"/>
           </a:xfrm>
           <a:prstGeom prst="rect">
             <a:avLst/>
@@ -8292,26 +8292,26 @@
             <a:pPr algn="ctr"/>
             <a:r>
               <a:rPr lang="en-US" sz="1400"/>
-              <a:t>Agency</a:t>
-            </a:r>
-          </a:p>
-        </p:txBody>
-      </p:sp>
-      <p:sp>
-        <p:nvSpPr>
-          <p:cNvPr id="12" name="Rectangle 11">
-            <a:extLst>
-              <a:ext uri="{FF2B5EF4-FFF2-40B4-BE49-F238E27FC236}">
-                <a16:creationId xmlns:a16="http://schemas.microsoft.com/office/drawing/2014/main" id="{3CCD1C28-5DF6-44EB-920C-EC57152A0D8B}"/>
-              </a:ext>
-            </a:extLst>
-          </p:cNvPr>
-          <p:cNvSpPr/>
-          <p:nvPr/>
-        </p:nvSpPr>
-        <p:spPr>
-          <a:xfrm>
-            <a:off x="5631868" y="1692300"/>
+              <a:t>Last name</a:t>
+            </a:r>
+          </a:p>
+        </p:txBody>
+      </p:sp>
+      <p:sp>
+        <p:nvSpPr>
+          <p:cNvPr id="13" name="Rectangle 12">
+            <a:extLst>
+              <a:ext uri="{FF2B5EF4-FFF2-40B4-BE49-F238E27FC236}">
+                <a16:creationId xmlns:a16="http://schemas.microsoft.com/office/drawing/2014/main" id="{868D2B36-8FE5-448A-BDC8-06396EB03A3F}"/>
+              </a:ext>
+            </a:extLst>
+          </p:cNvPr>
+          <p:cNvSpPr/>
+          <p:nvPr/>
+        </p:nvSpPr>
+        <p:spPr>
+          <a:xfrm>
+            <a:off x="5631868" y="2214961"/>
             <a:ext cx="1590968" cy="375213"/>
           </a:xfrm>
           <a:prstGeom prst="rect">
@@ -8339,27 +8339,74 @@
             <a:pPr algn="ctr"/>
             <a:r>
               <a:rPr lang="en-US" sz="1400"/>
-              <a:t>Last name</a:t>
-            </a:r>
-          </a:p>
-        </p:txBody>
-      </p:sp>
-      <p:sp>
-        <p:nvSpPr>
-          <p:cNvPr id="13" name="Rectangle 12">
-            <a:extLst>
-              <a:ext uri="{FF2B5EF4-FFF2-40B4-BE49-F238E27FC236}">
-                <a16:creationId xmlns:a16="http://schemas.microsoft.com/office/drawing/2014/main" id="{868D2B36-8FE5-448A-BDC8-06396EB03A3F}"/>
-              </a:ext>
-            </a:extLst>
-          </p:cNvPr>
-          <p:cNvSpPr/>
-          <p:nvPr/>
-        </p:nvSpPr>
-        <p:spPr>
-          <a:xfrm>
-            <a:off x="5631868" y="2214961"/>
-            <a:ext cx="1590968" cy="375213"/>
+              <a:t>Admission Type</a:t>
+            </a:r>
+          </a:p>
+        </p:txBody>
+      </p:sp>
+      <p:sp>
+        <p:nvSpPr>
+          <p:cNvPr id="18" name="Rectangle 17">
+            <a:extLst>
+              <a:ext uri="{FF2B5EF4-FFF2-40B4-BE49-F238E27FC236}">
+                <a16:creationId xmlns:a16="http://schemas.microsoft.com/office/drawing/2014/main" id="{CC900875-9094-414F-800C-ED9618E8058F}"/>
+              </a:ext>
+            </a:extLst>
+          </p:cNvPr>
+          <p:cNvSpPr/>
+          <p:nvPr/>
+        </p:nvSpPr>
+        <p:spPr>
+          <a:xfrm>
+            <a:off x="2219749" y="1217424"/>
+            <a:ext cx="1856600" cy="347506"/>
+          </a:xfrm>
+          <a:prstGeom prst="rect">
+            <a:avLst/>
+          </a:prstGeom>
+        </p:spPr>
+        <p:style>
+          <a:lnRef idx="1">
+            <a:schemeClr val="accent3"/>
+          </a:lnRef>
+          <a:fillRef idx="2">
+            <a:schemeClr val="accent3"/>
+          </a:fillRef>
+          <a:effectRef idx="1">
+            <a:schemeClr val="accent3"/>
+          </a:effectRef>
+          <a:fontRef idx="minor">
+            <a:schemeClr val="dk1"/>
+          </a:fontRef>
+        </p:style>
+        <p:txBody>
+          <a:bodyPr rtlCol="0" anchor="ctr"/>
+          <a:lstStyle/>
+          <a:p>
+            <a:pPr algn="ctr"/>
+            <a:r>
+              <a:rPr lang="en-US"/>
+              <a:t>JASA</a:t>
+            </a:r>
+          </a:p>
+        </p:txBody>
+      </p:sp>
+      <p:sp>
+        <p:nvSpPr>
+          <p:cNvPr id="19" name="Rectangle 18">
+            <a:extLst>
+              <a:ext uri="{FF2B5EF4-FFF2-40B4-BE49-F238E27FC236}">
+                <a16:creationId xmlns:a16="http://schemas.microsoft.com/office/drawing/2014/main" id="{CEE1AD42-0C03-495D-8F23-F33499C0A6EF}"/>
+              </a:ext>
+            </a:extLst>
+          </p:cNvPr>
+          <p:cNvSpPr/>
+          <p:nvPr/>
+        </p:nvSpPr>
+        <p:spPr>
+          <a:xfrm>
+            <a:off x="3799084" y="1217606"/>
+            <a:ext cx="267855" cy="332513"/>
           </a:xfrm>
           <a:prstGeom prst="rect">
             <a:avLst/>
@@ -8384,243 +8431,12 @@
           <a:lstStyle/>
           <a:p>
             <a:pPr algn="ctr"/>
-            <a:r>
-              <a:rPr lang="en-US" sz="1400"/>
-              <a:t>Admission Type</a:t>
-            </a:r>
-          </a:p>
-        </p:txBody>
-      </p:sp>
-      <p:sp>
-        <p:nvSpPr>
-          <p:cNvPr id="15" name="Rectangle 14">
-            <a:extLst>
-              <a:ext uri="{FF2B5EF4-FFF2-40B4-BE49-F238E27FC236}">
-                <a16:creationId xmlns:a16="http://schemas.microsoft.com/office/drawing/2014/main" id="{B17E0830-B6D5-4D53-9249-125783436C6D}"/>
-              </a:ext>
-            </a:extLst>
-          </p:cNvPr>
-          <p:cNvSpPr/>
-          <p:nvPr/>
-        </p:nvSpPr>
-        <p:spPr>
-          <a:xfrm>
-            <a:off x="2235200" y="1237672"/>
-            <a:ext cx="1773382" cy="338266"/>
-          </a:xfrm>
-          <a:prstGeom prst="rect">
-            <a:avLst/>
-          </a:prstGeom>
-        </p:spPr>
-        <p:style>
-          <a:lnRef idx="1">
-            <a:schemeClr val="accent3"/>
-          </a:lnRef>
-          <a:fillRef idx="2">
-            <a:schemeClr val="accent3"/>
-          </a:fillRef>
-          <a:effectRef idx="1">
-            <a:schemeClr val="accent3"/>
-          </a:effectRef>
-          <a:fontRef idx="minor">
-            <a:schemeClr val="dk1"/>
-          </a:fontRef>
-        </p:style>
-        <p:txBody>
-          <a:bodyPr rtlCol="0" anchor="ctr"/>
-          <a:lstStyle/>
-          <a:p>
-            <a:pPr algn="ctr"/>
-            <a:r>
-              <a:rPr lang="en-US"/>
-              <a:t>TL</a:t>
-            </a:r>
-          </a:p>
-        </p:txBody>
-      </p:sp>
-      <p:sp>
-        <p:nvSpPr>
-          <p:cNvPr id="16" name="Rectangle 15">
-            <a:extLst>
-              <a:ext uri="{FF2B5EF4-FFF2-40B4-BE49-F238E27FC236}">
-                <a16:creationId xmlns:a16="http://schemas.microsoft.com/office/drawing/2014/main" id="{80C3F056-1057-49DA-9124-1CD80474C8FD}"/>
-              </a:ext>
-            </a:extLst>
-          </p:cNvPr>
-          <p:cNvSpPr/>
-          <p:nvPr/>
-        </p:nvSpPr>
-        <p:spPr>
-          <a:xfrm>
-            <a:off x="3771901" y="1243952"/>
-            <a:ext cx="227446" cy="338266"/>
-          </a:xfrm>
-          <a:prstGeom prst="rect">
-            <a:avLst/>
-          </a:prstGeom>
-        </p:spPr>
-        <p:style>
-          <a:lnRef idx="2">
-            <a:schemeClr val="accent6"/>
-          </a:lnRef>
-          <a:fillRef idx="1">
-            <a:schemeClr val="lt1"/>
-          </a:fillRef>
-          <a:effectRef idx="0">
-            <a:schemeClr val="accent6"/>
-          </a:effectRef>
-          <a:fontRef idx="minor">
-            <a:schemeClr val="dk1"/>
-          </a:fontRef>
-        </p:style>
-        <p:txBody>
-          <a:bodyPr rtlCol="0" anchor="ctr"/>
-          <a:lstStyle/>
-          <a:p>
-            <a:pPr algn="ctr"/>
             <a:endParaRPr lang="en-US"/>
           </a:p>
         </p:txBody>
       </p:sp>
       <p:sp>
         <p:nvSpPr>
-          <p:cNvPr id="17" name="Flowchart: Merge 16">
-            <a:extLst>
-              <a:ext uri="{FF2B5EF4-FFF2-40B4-BE49-F238E27FC236}">
-                <a16:creationId xmlns:a16="http://schemas.microsoft.com/office/drawing/2014/main" id="{638B81E3-A37F-4BFA-9FD4-7E8A91C2E92E}"/>
-              </a:ext>
-            </a:extLst>
-          </p:cNvPr>
-          <p:cNvSpPr/>
-          <p:nvPr/>
-        </p:nvSpPr>
-        <p:spPr>
-          <a:xfrm>
-            <a:off x="3840480" y="1398271"/>
-            <a:ext cx="127179" cy="103156"/>
-          </a:xfrm>
-          <a:prstGeom prst="flowChartMerge">
-            <a:avLst/>
-          </a:prstGeom>
-        </p:spPr>
-        <p:style>
-          <a:lnRef idx="2">
-            <a:schemeClr val="accent1">
-              <a:shade val="50000"/>
-            </a:schemeClr>
-          </a:lnRef>
-          <a:fillRef idx="1">
-            <a:schemeClr val="accent1"/>
-          </a:fillRef>
-          <a:effectRef idx="0">
-            <a:schemeClr val="accent1"/>
-          </a:effectRef>
-          <a:fontRef idx="minor">
-            <a:schemeClr val="lt1"/>
-          </a:fontRef>
-        </p:style>
-        <p:txBody>
-          <a:bodyPr rtlCol="0" anchor="ctr"/>
-          <a:lstStyle/>
-          <a:p>
-            <a:pPr algn="ctr"/>
-            <a:endParaRPr lang="en-US"/>
-          </a:p>
-        </p:txBody>
-      </p:sp>
-      <p:sp>
-        <p:nvSpPr>
-          <p:cNvPr id="18" name="Rectangle 17">
-            <a:extLst>
-              <a:ext uri="{FF2B5EF4-FFF2-40B4-BE49-F238E27FC236}">
-                <a16:creationId xmlns:a16="http://schemas.microsoft.com/office/drawing/2014/main" id="{CC900875-9094-414F-800C-ED9618E8058F}"/>
-              </a:ext>
-            </a:extLst>
-          </p:cNvPr>
-          <p:cNvSpPr/>
-          <p:nvPr/>
-        </p:nvSpPr>
-        <p:spPr>
-          <a:xfrm>
-            <a:off x="7659256" y="1200725"/>
-            <a:ext cx="1856600" cy="347506"/>
-          </a:xfrm>
-          <a:prstGeom prst="rect">
-            <a:avLst/>
-          </a:prstGeom>
-        </p:spPr>
-        <p:style>
-          <a:lnRef idx="1">
-            <a:schemeClr val="accent3"/>
-          </a:lnRef>
-          <a:fillRef idx="2">
-            <a:schemeClr val="accent3"/>
-          </a:fillRef>
-          <a:effectRef idx="1">
-            <a:schemeClr val="accent3"/>
-          </a:effectRef>
-          <a:fontRef idx="minor">
-            <a:schemeClr val="dk1"/>
-          </a:fontRef>
-        </p:style>
-        <p:txBody>
-          <a:bodyPr rtlCol="0" anchor="ctr"/>
-          <a:lstStyle/>
-          <a:p>
-            <a:pPr algn="ctr"/>
-            <a:r>
-              <a:rPr lang="en-US"/>
-              <a:t>Home Health</a:t>
-            </a:r>
-          </a:p>
-        </p:txBody>
-      </p:sp>
-      <p:sp>
-        <p:nvSpPr>
-          <p:cNvPr id="19" name="Rectangle 18">
-            <a:extLst>
-              <a:ext uri="{FF2B5EF4-FFF2-40B4-BE49-F238E27FC236}">
-                <a16:creationId xmlns:a16="http://schemas.microsoft.com/office/drawing/2014/main" id="{CEE1AD42-0C03-495D-8F23-F33499C0A6EF}"/>
-              </a:ext>
-            </a:extLst>
-          </p:cNvPr>
-          <p:cNvSpPr/>
-          <p:nvPr/>
-        </p:nvSpPr>
-        <p:spPr>
-          <a:xfrm>
-            <a:off x="9238591" y="1200907"/>
-            <a:ext cx="267855" cy="332513"/>
-          </a:xfrm>
-          <a:prstGeom prst="rect">
-            <a:avLst/>
-          </a:prstGeom>
-        </p:spPr>
-        <p:style>
-          <a:lnRef idx="2">
-            <a:schemeClr val="accent6"/>
-          </a:lnRef>
-          <a:fillRef idx="1">
-            <a:schemeClr val="lt1"/>
-          </a:fillRef>
-          <a:effectRef idx="0">
-            <a:schemeClr val="accent6"/>
-          </a:effectRef>
-          <a:fontRef idx="minor">
-            <a:schemeClr val="dk1"/>
-          </a:fontRef>
-        </p:style>
-        <p:txBody>
-          <a:bodyPr rtlCol="0" anchor="ctr"/>
-          <a:lstStyle/>
-          <a:p>
-            <a:pPr algn="ctr"/>
-            <a:endParaRPr lang="en-US"/>
-          </a:p>
-        </p:txBody>
-      </p:sp>
-      <p:sp>
-        <p:nvSpPr>
           <p:cNvPr id="20" name="Flowchart: Merge 19">
             <a:extLst>
               <a:ext uri="{FF2B5EF4-FFF2-40B4-BE49-F238E27FC236}">
@@ -8633,7 +8449,7 @@
         </p:nvSpPr>
         <p:spPr>
           <a:xfrm>
-            <a:off x="9303246" y="1367163"/>
+            <a:off x="3863739" y="1383862"/>
             <a:ext cx="129309" cy="110837"/>
           </a:xfrm>
           <a:prstGeom prst="flowChartMerge">
@@ -9021,8 +8837,8 @@
         </p:nvSpPr>
         <p:spPr>
           <a:xfrm>
-            <a:off x="4008582" y="0"/>
-            <a:ext cx="4525818" cy="411024"/>
+            <a:off x="3799084" y="0"/>
+            <a:ext cx="4735316" cy="411024"/>
           </a:xfrm>
           <a:prstGeom prst="rect">
             <a:avLst/>
@@ -9060,7 +8876,7 @@
             </a:r>
             <a:r>
               <a:rPr lang="en-US"/>
-              <a:t> tool – Review responses for clients</a:t>
+              <a:t> tool – Review responses for Patients</a:t>
             </a:r>
           </a:p>
         </p:txBody>
@@ -9654,7 +9470,7 @@
         <p:spPr>
           <a:xfrm>
             <a:off x="305512" y="2744476"/>
-            <a:ext cx="1380914" cy="338266"/>
+            <a:ext cx="1590966" cy="338266"/>
           </a:xfrm>
           <a:prstGeom prst="rect">
             <a:avLst/>
@@ -10226,7 +10042,7 @@
             <a:pPr algn="ctr"/>
             <a:r>
               <a:rPr lang="en-US" sz="1400"/>
-              <a:t>Client</a:t>
+              <a:t>Patients</a:t>
             </a:r>
           </a:p>
         </p:txBody>
@@ -10272,8 +10088,8 @@
           <a:p>
             <a:pPr algn="ctr"/>
             <a:r>
-              <a:rPr lang="en-US" sz="1400"/>
-              <a:t>Authorization</a:t>
+              <a:rPr lang="en-US" sz="1300"/>
+              <a:t>Authorizations</a:t>
             </a:r>
           </a:p>
         </p:txBody>
@@ -10367,7 +10183,7 @@
             <a:pPr algn="ctr"/>
             <a:r>
               <a:rPr lang="en-US" sz="1400"/>
-              <a:t>Billing</a:t>
+              <a:t>Billings</a:t>
             </a:r>
           </a:p>
         </p:txBody>
@@ -10451,20 +10267,20 @@
       </p:grpSpPr>
       <p:sp>
         <p:nvSpPr>
-          <p:cNvPr id="6" name="Rectangle 5">
-            <a:extLst>
-              <a:ext uri="{FF2B5EF4-FFF2-40B4-BE49-F238E27FC236}">
-                <a16:creationId xmlns:a16="http://schemas.microsoft.com/office/drawing/2014/main" id="{DF2B91E9-EED4-4DD8-9263-1C184BC2C671}"/>
-              </a:ext>
-            </a:extLst>
-          </p:cNvPr>
-          <p:cNvSpPr/>
-          <p:nvPr/>
-        </p:nvSpPr>
-        <p:spPr>
-          <a:xfrm>
-            <a:off x="323272" y="1237673"/>
-            <a:ext cx="1380915" cy="338266"/>
+          <p:cNvPr id="7" name="Rectangle 6">
+            <a:extLst>
+              <a:ext uri="{FF2B5EF4-FFF2-40B4-BE49-F238E27FC236}">
+                <a16:creationId xmlns:a16="http://schemas.microsoft.com/office/drawing/2014/main" id="{D6BAFB21-A5ED-4D97-A21B-7037E5B62055}"/>
+              </a:ext>
+            </a:extLst>
+          </p:cNvPr>
+          <p:cNvSpPr/>
+          <p:nvPr/>
+        </p:nvSpPr>
+        <p:spPr>
+          <a:xfrm>
+            <a:off x="323273" y="1716827"/>
+            <a:ext cx="1380914" cy="338266"/>
           </a:xfrm>
           <a:prstGeom prst="rect">
             <a:avLst/>
@@ -10491,26 +10307,26 @@
             <a:pPr algn="ctr"/>
             <a:r>
               <a:rPr lang="en-US" sz="1400"/>
-              <a:t>Jurisdiction</a:t>
-            </a:r>
-          </a:p>
-        </p:txBody>
-      </p:sp>
-      <p:sp>
-        <p:nvSpPr>
-          <p:cNvPr id="7" name="Rectangle 6">
-            <a:extLst>
-              <a:ext uri="{FF2B5EF4-FFF2-40B4-BE49-F238E27FC236}">
-                <a16:creationId xmlns:a16="http://schemas.microsoft.com/office/drawing/2014/main" id="{D6BAFB21-A5ED-4D97-A21B-7037E5B62055}"/>
-              </a:ext>
-            </a:extLst>
-          </p:cNvPr>
-          <p:cNvSpPr/>
-          <p:nvPr/>
-        </p:nvSpPr>
-        <p:spPr>
-          <a:xfrm>
-            <a:off x="323273" y="1716827"/>
+              <a:t>First name</a:t>
+            </a:r>
+          </a:p>
+        </p:txBody>
+      </p:sp>
+      <p:sp>
+        <p:nvSpPr>
+          <p:cNvPr id="8" name="Rectangle 7">
+            <a:extLst>
+              <a:ext uri="{FF2B5EF4-FFF2-40B4-BE49-F238E27FC236}">
+                <a16:creationId xmlns:a16="http://schemas.microsoft.com/office/drawing/2014/main" id="{6676BFCD-4CA3-4401-B454-D77FF8A98A72}"/>
+              </a:ext>
+            </a:extLst>
+          </p:cNvPr>
+          <p:cNvSpPr/>
+          <p:nvPr/>
+        </p:nvSpPr>
+        <p:spPr>
+          <a:xfrm>
+            <a:off x="323272" y="2219609"/>
             <a:ext cx="1380914" cy="338266"/>
           </a:xfrm>
           <a:prstGeom prst="rect">
@@ -10538,26 +10354,26 @@
             <a:pPr algn="ctr"/>
             <a:r>
               <a:rPr lang="en-US" sz="1400"/>
-              <a:t>First name</a:t>
-            </a:r>
-          </a:p>
-        </p:txBody>
-      </p:sp>
-      <p:sp>
-        <p:nvSpPr>
-          <p:cNvPr id="8" name="Rectangle 7">
-            <a:extLst>
-              <a:ext uri="{FF2B5EF4-FFF2-40B4-BE49-F238E27FC236}">
-                <a16:creationId xmlns:a16="http://schemas.microsoft.com/office/drawing/2014/main" id="{6676BFCD-4CA3-4401-B454-D77FF8A98A72}"/>
-              </a:ext>
-            </a:extLst>
-          </p:cNvPr>
-          <p:cNvSpPr/>
-          <p:nvPr/>
-        </p:nvSpPr>
-        <p:spPr>
-          <a:xfrm>
-            <a:off x="323272" y="2219609"/>
+              <a:t>Service</a:t>
+            </a:r>
+          </a:p>
+        </p:txBody>
+      </p:sp>
+      <p:sp>
+        <p:nvSpPr>
+          <p:cNvPr id="9" name="Rectangle 8">
+            <a:extLst>
+              <a:ext uri="{FF2B5EF4-FFF2-40B4-BE49-F238E27FC236}">
+                <a16:creationId xmlns:a16="http://schemas.microsoft.com/office/drawing/2014/main" id="{4C36CCE1-27C2-47E1-BDE9-A914861A542A}"/>
+              </a:ext>
+            </a:extLst>
+          </p:cNvPr>
+          <p:cNvSpPr/>
+          <p:nvPr/>
+        </p:nvSpPr>
+        <p:spPr>
+          <a:xfrm>
+            <a:off x="305512" y="4486783"/>
             <a:ext cx="1380914" cy="338266"/>
           </a:xfrm>
           <a:prstGeom prst="rect">
@@ -10585,26 +10401,26 @@
             <a:pPr algn="ctr"/>
             <a:r>
               <a:rPr lang="en-US" sz="1400"/>
-              <a:t>Service</a:t>
-            </a:r>
-          </a:p>
-        </p:txBody>
-      </p:sp>
-      <p:sp>
-        <p:nvSpPr>
-          <p:cNvPr id="9" name="Rectangle 8">
-            <a:extLst>
-              <a:ext uri="{FF2B5EF4-FFF2-40B4-BE49-F238E27FC236}">
-                <a16:creationId xmlns:a16="http://schemas.microsoft.com/office/drawing/2014/main" id="{4C36CCE1-27C2-47E1-BDE9-A914861A542A}"/>
-              </a:ext>
-            </a:extLst>
-          </p:cNvPr>
-          <p:cNvSpPr/>
-          <p:nvPr/>
-        </p:nvSpPr>
-        <p:spPr>
-          <a:xfrm>
-            <a:off x="305512" y="4486783"/>
+              <a:t>End</a:t>
+            </a:r>
+          </a:p>
+        </p:txBody>
+      </p:sp>
+      <p:sp>
+        <p:nvSpPr>
+          <p:cNvPr id="10" name="Rectangle 9">
+            <a:extLst>
+              <a:ext uri="{FF2B5EF4-FFF2-40B4-BE49-F238E27FC236}">
+                <a16:creationId xmlns:a16="http://schemas.microsoft.com/office/drawing/2014/main" id="{843BE703-94CE-4448-B367-F5DBE92E5A21}"/>
+              </a:ext>
+            </a:extLst>
+          </p:cNvPr>
+          <p:cNvSpPr/>
+          <p:nvPr/>
+        </p:nvSpPr>
+        <p:spPr>
+          <a:xfrm>
+            <a:off x="305512" y="3945875"/>
             <a:ext cx="1380914" cy="338266"/>
           </a:xfrm>
           <a:prstGeom prst="rect">
@@ -10632,27 +10448,27 @@
             <a:pPr algn="ctr"/>
             <a:r>
               <a:rPr lang="en-US" sz="1400"/>
-              <a:t>End</a:t>
-            </a:r>
-          </a:p>
-        </p:txBody>
-      </p:sp>
-      <p:sp>
-        <p:nvSpPr>
-          <p:cNvPr id="10" name="Rectangle 9">
-            <a:extLst>
-              <a:ext uri="{FF2B5EF4-FFF2-40B4-BE49-F238E27FC236}">
-                <a16:creationId xmlns:a16="http://schemas.microsoft.com/office/drawing/2014/main" id="{843BE703-94CE-4448-B367-F5DBE92E5A21}"/>
-              </a:ext>
-            </a:extLst>
-          </p:cNvPr>
-          <p:cNvSpPr/>
-          <p:nvPr/>
-        </p:nvSpPr>
-        <p:spPr>
-          <a:xfrm>
-            <a:off x="305512" y="3945875"/>
-            <a:ext cx="1380914" cy="338266"/>
+              <a:t>Begin</a:t>
+            </a:r>
+          </a:p>
+        </p:txBody>
+      </p:sp>
+      <p:sp>
+        <p:nvSpPr>
+          <p:cNvPr id="11" name="Rectangle 10">
+            <a:extLst>
+              <a:ext uri="{FF2B5EF4-FFF2-40B4-BE49-F238E27FC236}">
+                <a16:creationId xmlns:a16="http://schemas.microsoft.com/office/drawing/2014/main" id="{C7FF2387-9D28-4BCA-9A73-D405644BC1C1}"/>
+              </a:ext>
+            </a:extLst>
+          </p:cNvPr>
+          <p:cNvSpPr/>
+          <p:nvPr/>
+        </p:nvSpPr>
+        <p:spPr>
+          <a:xfrm>
+            <a:off x="323272" y="1161487"/>
+            <a:ext cx="1380914" cy="375213"/>
           </a:xfrm>
           <a:prstGeom prst="rect">
             <a:avLst/>
@@ -10679,27 +10495,27 @@
             <a:pPr algn="ctr"/>
             <a:r>
               <a:rPr lang="en-US" sz="1400"/>
-              <a:t>Begin</a:t>
-            </a:r>
-          </a:p>
-        </p:txBody>
-      </p:sp>
-      <p:sp>
-        <p:nvSpPr>
-          <p:cNvPr id="11" name="Rectangle 10">
-            <a:extLst>
-              <a:ext uri="{FF2B5EF4-FFF2-40B4-BE49-F238E27FC236}">
-                <a16:creationId xmlns:a16="http://schemas.microsoft.com/office/drawing/2014/main" id="{C7FF2387-9D28-4BCA-9A73-D405644BC1C1}"/>
-              </a:ext>
-            </a:extLst>
-          </p:cNvPr>
-          <p:cNvSpPr/>
-          <p:nvPr/>
-        </p:nvSpPr>
-        <p:spPr>
-          <a:xfrm>
-            <a:off x="5631870" y="1200724"/>
-            <a:ext cx="1590966" cy="375213"/>
+              <a:t>Agency</a:t>
+            </a:r>
+          </a:p>
+        </p:txBody>
+      </p:sp>
+      <p:sp>
+        <p:nvSpPr>
+          <p:cNvPr id="12" name="Rectangle 11">
+            <a:extLst>
+              <a:ext uri="{FF2B5EF4-FFF2-40B4-BE49-F238E27FC236}">
+                <a16:creationId xmlns:a16="http://schemas.microsoft.com/office/drawing/2014/main" id="{3CCD1C28-5DF6-44EB-920C-EC57152A0D8B}"/>
+              </a:ext>
+            </a:extLst>
+          </p:cNvPr>
+          <p:cNvSpPr/>
+          <p:nvPr/>
+        </p:nvSpPr>
+        <p:spPr>
+          <a:xfrm>
+            <a:off x="5631868" y="1692300"/>
+            <a:ext cx="1590968" cy="375213"/>
           </a:xfrm>
           <a:prstGeom prst="rect">
             <a:avLst/>
@@ -10726,26 +10542,26 @@
             <a:pPr algn="ctr"/>
             <a:r>
               <a:rPr lang="en-US" sz="1400"/>
-              <a:t>Agency</a:t>
-            </a:r>
-          </a:p>
-        </p:txBody>
-      </p:sp>
-      <p:sp>
-        <p:nvSpPr>
-          <p:cNvPr id="12" name="Rectangle 11">
-            <a:extLst>
-              <a:ext uri="{FF2B5EF4-FFF2-40B4-BE49-F238E27FC236}">
-                <a16:creationId xmlns:a16="http://schemas.microsoft.com/office/drawing/2014/main" id="{3CCD1C28-5DF6-44EB-920C-EC57152A0D8B}"/>
-              </a:ext>
-            </a:extLst>
-          </p:cNvPr>
-          <p:cNvSpPr/>
-          <p:nvPr/>
-        </p:nvSpPr>
-        <p:spPr>
-          <a:xfrm>
-            <a:off x="5631868" y="1692300"/>
+              <a:t>Last name</a:t>
+            </a:r>
+          </a:p>
+        </p:txBody>
+      </p:sp>
+      <p:sp>
+        <p:nvSpPr>
+          <p:cNvPr id="13" name="Rectangle 12">
+            <a:extLst>
+              <a:ext uri="{FF2B5EF4-FFF2-40B4-BE49-F238E27FC236}">
+                <a16:creationId xmlns:a16="http://schemas.microsoft.com/office/drawing/2014/main" id="{868D2B36-8FE5-448A-BDC8-06396EB03A3F}"/>
+              </a:ext>
+            </a:extLst>
+          </p:cNvPr>
+          <p:cNvSpPr/>
+          <p:nvPr/>
+        </p:nvSpPr>
+        <p:spPr>
+          <a:xfrm>
+            <a:off x="5631868" y="2214961"/>
             <a:ext cx="1590968" cy="375213"/>
           </a:xfrm>
           <a:prstGeom prst="rect">
@@ -10773,27 +10589,74 @@
             <a:pPr algn="ctr"/>
             <a:r>
               <a:rPr lang="en-US" sz="1400"/>
-              <a:t>Last name</a:t>
-            </a:r>
-          </a:p>
-        </p:txBody>
-      </p:sp>
-      <p:sp>
-        <p:nvSpPr>
-          <p:cNvPr id="13" name="Rectangle 12">
-            <a:extLst>
-              <a:ext uri="{FF2B5EF4-FFF2-40B4-BE49-F238E27FC236}">
-                <a16:creationId xmlns:a16="http://schemas.microsoft.com/office/drawing/2014/main" id="{868D2B36-8FE5-448A-BDC8-06396EB03A3F}"/>
-              </a:ext>
-            </a:extLst>
-          </p:cNvPr>
-          <p:cNvSpPr/>
-          <p:nvPr/>
-        </p:nvSpPr>
-        <p:spPr>
-          <a:xfrm>
-            <a:off x="5631868" y="2214961"/>
-            <a:ext cx="1590968" cy="375213"/>
+              <a:t>Admission Type</a:t>
+            </a:r>
+          </a:p>
+        </p:txBody>
+      </p:sp>
+      <p:sp>
+        <p:nvSpPr>
+          <p:cNvPr id="18" name="Rectangle 17">
+            <a:extLst>
+              <a:ext uri="{FF2B5EF4-FFF2-40B4-BE49-F238E27FC236}">
+                <a16:creationId xmlns:a16="http://schemas.microsoft.com/office/drawing/2014/main" id="{CC900875-9094-414F-800C-ED9618E8058F}"/>
+              </a:ext>
+            </a:extLst>
+          </p:cNvPr>
+          <p:cNvSpPr/>
+          <p:nvPr/>
+        </p:nvSpPr>
+        <p:spPr>
+          <a:xfrm>
+            <a:off x="2219750" y="1161488"/>
+            <a:ext cx="1841380" cy="347506"/>
+          </a:xfrm>
+          <a:prstGeom prst="rect">
+            <a:avLst/>
+          </a:prstGeom>
+        </p:spPr>
+        <p:style>
+          <a:lnRef idx="1">
+            <a:schemeClr val="accent3"/>
+          </a:lnRef>
+          <a:fillRef idx="2">
+            <a:schemeClr val="accent3"/>
+          </a:fillRef>
+          <a:effectRef idx="1">
+            <a:schemeClr val="accent3"/>
+          </a:effectRef>
+          <a:fontRef idx="minor">
+            <a:schemeClr val="dk1"/>
+          </a:fontRef>
+        </p:style>
+        <p:txBody>
+          <a:bodyPr rtlCol="0" anchor="ctr"/>
+          <a:lstStyle/>
+          <a:p>
+            <a:pPr algn="ctr"/>
+            <a:r>
+              <a:rPr lang="en-US"/>
+              <a:t>JASA</a:t>
+            </a:r>
+          </a:p>
+        </p:txBody>
+      </p:sp>
+      <p:sp>
+        <p:nvSpPr>
+          <p:cNvPr id="19" name="Rectangle 18">
+            <a:extLst>
+              <a:ext uri="{FF2B5EF4-FFF2-40B4-BE49-F238E27FC236}">
+                <a16:creationId xmlns:a16="http://schemas.microsoft.com/office/drawing/2014/main" id="{CEE1AD42-0C03-495D-8F23-F33499C0A6EF}"/>
+              </a:ext>
+            </a:extLst>
+          </p:cNvPr>
+          <p:cNvSpPr/>
+          <p:nvPr/>
+        </p:nvSpPr>
+        <p:spPr>
+          <a:xfrm>
+            <a:off x="3793274" y="1161669"/>
+            <a:ext cx="267855" cy="332513"/>
           </a:xfrm>
           <a:prstGeom prst="rect">
             <a:avLst/>
@@ -10818,243 +10681,12 @@
           <a:lstStyle/>
           <a:p>
             <a:pPr algn="ctr"/>
-            <a:r>
-              <a:rPr lang="en-US" sz="1400"/>
-              <a:t>Admission Type</a:t>
-            </a:r>
-          </a:p>
-        </p:txBody>
-      </p:sp>
-      <p:sp>
-        <p:nvSpPr>
-          <p:cNvPr id="15" name="Rectangle 14">
-            <a:extLst>
-              <a:ext uri="{FF2B5EF4-FFF2-40B4-BE49-F238E27FC236}">
-                <a16:creationId xmlns:a16="http://schemas.microsoft.com/office/drawing/2014/main" id="{B17E0830-B6D5-4D53-9249-125783436C6D}"/>
-              </a:ext>
-            </a:extLst>
-          </p:cNvPr>
-          <p:cNvSpPr/>
-          <p:nvPr/>
-        </p:nvSpPr>
-        <p:spPr>
-          <a:xfrm>
-            <a:off x="2235200" y="1237672"/>
-            <a:ext cx="1773382" cy="338266"/>
-          </a:xfrm>
-          <a:prstGeom prst="rect">
-            <a:avLst/>
-          </a:prstGeom>
-        </p:spPr>
-        <p:style>
-          <a:lnRef idx="1">
-            <a:schemeClr val="accent3"/>
-          </a:lnRef>
-          <a:fillRef idx="2">
-            <a:schemeClr val="accent3"/>
-          </a:fillRef>
-          <a:effectRef idx="1">
-            <a:schemeClr val="accent3"/>
-          </a:effectRef>
-          <a:fontRef idx="minor">
-            <a:schemeClr val="dk1"/>
-          </a:fontRef>
-        </p:style>
-        <p:txBody>
-          <a:bodyPr rtlCol="0" anchor="ctr"/>
-          <a:lstStyle/>
-          <a:p>
-            <a:pPr algn="ctr"/>
-            <a:r>
-              <a:rPr lang="en-US"/>
-              <a:t>TL</a:t>
-            </a:r>
-          </a:p>
-        </p:txBody>
-      </p:sp>
-      <p:sp>
-        <p:nvSpPr>
-          <p:cNvPr id="16" name="Rectangle 15">
-            <a:extLst>
-              <a:ext uri="{FF2B5EF4-FFF2-40B4-BE49-F238E27FC236}">
-                <a16:creationId xmlns:a16="http://schemas.microsoft.com/office/drawing/2014/main" id="{80C3F056-1057-49DA-9124-1CD80474C8FD}"/>
-              </a:ext>
-            </a:extLst>
-          </p:cNvPr>
-          <p:cNvSpPr/>
-          <p:nvPr/>
-        </p:nvSpPr>
-        <p:spPr>
-          <a:xfrm>
-            <a:off x="3771901" y="1243952"/>
-            <a:ext cx="227446" cy="338266"/>
-          </a:xfrm>
-          <a:prstGeom prst="rect">
-            <a:avLst/>
-          </a:prstGeom>
-        </p:spPr>
-        <p:style>
-          <a:lnRef idx="2">
-            <a:schemeClr val="accent6"/>
-          </a:lnRef>
-          <a:fillRef idx="1">
-            <a:schemeClr val="lt1"/>
-          </a:fillRef>
-          <a:effectRef idx="0">
-            <a:schemeClr val="accent6"/>
-          </a:effectRef>
-          <a:fontRef idx="minor">
-            <a:schemeClr val="dk1"/>
-          </a:fontRef>
-        </p:style>
-        <p:txBody>
-          <a:bodyPr rtlCol="0" anchor="ctr"/>
-          <a:lstStyle/>
-          <a:p>
-            <a:pPr algn="ctr"/>
             <a:endParaRPr lang="en-US"/>
           </a:p>
         </p:txBody>
       </p:sp>
       <p:sp>
         <p:nvSpPr>
-          <p:cNvPr id="17" name="Flowchart: Merge 16">
-            <a:extLst>
-              <a:ext uri="{FF2B5EF4-FFF2-40B4-BE49-F238E27FC236}">
-                <a16:creationId xmlns:a16="http://schemas.microsoft.com/office/drawing/2014/main" id="{638B81E3-A37F-4BFA-9FD4-7E8A91C2E92E}"/>
-              </a:ext>
-            </a:extLst>
-          </p:cNvPr>
-          <p:cNvSpPr/>
-          <p:nvPr/>
-        </p:nvSpPr>
-        <p:spPr>
-          <a:xfrm>
-            <a:off x="3840480" y="1398271"/>
-            <a:ext cx="127179" cy="103156"/>
-          </a:xfrm>
-          <a:prstGeom prst="flowChartMerge">
-            <a:avLst/>
-          </a:prstGeom>
-        </p:spPr>
-        <p:style>
-          <a:lnRef idx="2">
-            <a:schemeClr val="accent1">
-              <a:shade val="50000"/>
-            </a:schemeClr>
-          </a:lnRef>
-          <a:fillRef idx="1">
-            <a:schemeClr val="accent1"/>
-          </a:fillRef>
-          <a:effectRef idx="0">
-            <a:schemeClr val="accent1"/>
-          </a:effectRef>
-          <a:fontRef idx="minor">
-            <a:schemeClr val="lt1"/>
-          </a:fontRef>
-        </p:style>
-        <p:txBody>
-          <a:bodyPr rtlCol="0" anchor="ctr"/>
-          <a:lstStyle/>
-          <a:p>
-            <a:pPr algn="ctr"/>
-            <a:endParaRPr lang="en-US"/>
-          </a:p>
-        </p:txBody>
-      </p:sp>
-      <p:sp>
-        <p:nvSpPr>
-          <p:cNvPr id="18" name="Rectangle 17">
-            <a:extLst>
-              <a:ext uri="{FF2B5EF4-FFF2-40B4-BE49-F238E27FC236}">
-                <a16:creationId xmlns:a16="http://schemas.microsoft.com/office/drawing/2014/main" id="{CC900875-9094-414F-800C-ED9618E8058F}"/>
-              </a:ext>
-            </a:extLst>
-          </p:cNvPr>
-          <p:cNvSpPr/>
-          <p:nvPr/>
-        </p:nvSpPr>
-        <p:spPr>
-          <a:xfrm>
-            <a:off x="7659256" y="1200725"/>
-            <a:ext cx="1856600" cy="347506"/>
-          </a:xfrm>
-          <a:prstGeom prst="rect">
-            <a:avLst/>
-          </a:prstGeom>
-        </p:spPr>
-        <p:style>
-          <a:lnRef idx="1">
-            <a:schemeClr val="accent3"/>
-          </a:lnRef>
-          <a:fillRef idx="2">
-            <a:schemeClr val="accent3"/>
-          </a:fillRef>
-          <a:effectRef idx="1">
-            <a:schemeClr val="accent3"/>
-          </a:effectRef>
-          <a:fontRef idx="minor">
-            <a:schemeClr val="dk1"/>
-          </a:fontRef>
-        </p:style>
-        <p:txBody>
-          <a:bodyPr rtlCol="0" anchor="ctr"/>
-          <a:lstStyle/>
-          <a:p>
-            <a:pPr algn="ctr"/>
-            <a:r>
-              <a:rPr lang="en-US"/>
-              <a:t>Home Health</a:t>
-            </a:r>
-          </a:p>
-        </p:txBody>
-      </p:sp>
-      <p:sp>
-        <p:nvSpPr>
-          <p:cNvPr id="19" name="Rectangle 18">
-            <a:extLst>
-              <a:ext uri="{FF2B5EF4-FFF2-40B4-BE49-F238E27FC236}">
-                <a16:creationId xmlns:a16="http://schemas.microsoft.com/office/drawing/2014/main" id="{CEE1AD42-0C03-495D-8F23-F33499C0A6EF}"/>
-              </a:ext>
-            </a:extLst>
-          </p:cNvPr>
-          <p:cNvSpPr/>
-          <p:nvPr/>
-        </p:nvSpPr>
-        <p:spPr>
-          <a:xfrm>
-            <a:off x="9238591" y="1200907"/>
-            <a:ext cx="267855" cy="332513"/>
-          </a:xfrm>
-          <a:prstGeom prst="rect">
-            <a:avLst/>
-          </a:prstGeom>
-        </p:spPr>
-        <p:style>
-          <a:lnRef idx="2">
-            <a:schemeClr val="accent6"/>
-          </a:lnRef>
-          <a:fillRef idx="1">
-            <a:schemeClr val="lt1"/>
-          </a:fillRef>
-          <a:effectRef idx="0">
-            <a:schemeClr val="accent6"/>
-          </a:effectRef>
-          <a:fontRef idx="minor">
-            <a:schemeClr val="dk1"/>
-          </a:fontRef>
-        </p:style>
-        <p:txBody>
-          <a:bodyPr rtlCol="0" anchor="ctr"/>
-          <a:lstStyle/>
-          <a:p>
-            <a:pPr algn="ctr"/>
-            <a:endParaRPr lang="en-US"/>
-          </a:p>
-        </p:txBody>
-      </p:sp>
-      <p:sp>
-        <p:nvSpPr>
           <p:cNvPr id="20" name="Flowchart: Merge 19">
             <a:extLst>
               <a:ext uri="{FF2B5EF4-FFF2-40B4-BE49-F238E27FC236}">
@@ -11067,7 +10699,7 @@
         </p:nvSpPr>
         <p:spPr>
           <a:xfrm>
-            <a:off x="9303246" y="1367163"/>
+            <a:off x="3862546" y="1332952"/>
             <a:ext cx="129309" cy="110837"/>
           </a:xfrm>
           <a:prstGeom prst="flowChartMerge">
@@ -12756,7 +12388,7 @@
             <a:pPr algn="ctr"/>
             <a:r>
               <a:rPr lang="en-US" sz="1400"/>
-              <a:t>Client</a:t>
+              <a:t>Patients</a:t>
             </a:r>
           </a:p>
         </p:txBody>
@@ -12802,8 +12434,8 @@
           <a:p>
             <a:pPr algn="ctr"/>
             <a:r>
-              <a:rPr lang="en-US" sz="1400"/>
-              <a:t>Authorization</a:t>
+              <a:rPr lang="en-US" sz="1300"/>
+              <a:t>Authorizations</a:t>
             </a:r>
           </a:p>
         </p:txBody>
@@ -12897,7 +12529,7 @@
             <a:pPr algn="ctr"/>
             <a:r>
               <a:rPr lang="en-US" sz="1400"/>
-              <a:t>Billing</a:t>
+              <a:t>Billings</a:t>
             </a:r>
           </a:p>
         </p:txBody>
@@ -12981,19 +12613,19 @@
       </p:grpSpPr>
       <p:sp>
         <p:nvSpPr>
-          <p:cNvPr id="6" name="Rectangle 5">
-            <a:extLst>
-              <a:ext uri="{FF2B5EF4-FFF2-40B4-BE49-F238E27FC236}">
-                <a16:creationId xmlns:a16="http://schemas.microsoft.com/office/drawing/2014/main" id="{DF2B91E9-EED4-4DD8-9263-1C184BC2C671}"/>
-              </a:ext>
-            </a:extLst>
-          </p:cNvPr>
-          <p:cNvSpPr/>
-          <p:nvPr/>
-        </p:nvSpPr>
-        <p:spPr>
-          <a:xfrm>
-            <a:off x="323273" y="1237673"/>
+          <p:cNvPr id="7" name="Rectangle 6">
+            <a:extLst>
+              <a:ext uri="{FF2B5EF4-FFF2-40B4-BE49-F238E27FC236}">
+                <a16:creationId xmlns:a16="http://schemas.microsoft.com/office/drawing/2014/main" id="{D6BAFB21-A5ED-4D97-A21B-7037E5B62055}"/>
+              </a:ext>
+            </a:extLst>
+          </p:cNvPr>
+          <p:cNvSpPr/>
+          <p:nvPr/>
+        </p:nvSpPr>
+        <p:spPr>
+          <a:xfrm>
+            <a:off x="313117" y="1993406"/>
             <a:ext cx="1020582" cy="338266"/>
           </a:xfrm>
           <a:prstGeom prst="rect">
@@ -13021,27 +12653,27 @@
             <a:pPr algn="ctr"/>
             <a:r>
               <a:rPr lang="en-US" sz="1400"/>
-              <a:t>Jurisdiction</a:t>
-            </a:r>
-          </a:p>
-        </p:txBody>
-      </p:sp>
-      <p:sp>
-        <p:nvSpPr>
-          <p:cNvPr id="7" name="Rectangle 6">
-            <a:extLst>
-              <a:ext uri="{FF2B5EF4-FFF2-40B4-BE49-F238E27FC236}">
-                <a16:creationId xmlns:a16="http://schemas.microsoft.com/office/drawing/2014/main" id="{D6BAFB21-A5ED-4D97-A21B-7037E5B62055}"/>
-              </a:ext>
-            </a:extLst>
-          </p:cNvPr>
-          <p:cNvSpPr/>
-          <p:nvPr/>
-        </p:nvSpPr>
-        <p:spPr>
-          <a:xfrm>
-            <a:off x="313117" y="1993406"/>
-            <a:ext cx="1020582" cy="338266"/>
+              <a:t>First name</a:t>
+            </a:r>
+          </a:p>
+        </p:txBody>
+      </p:sp>
+      <p:sp>
+        <p:nvSpPr>
+          <p:cNvPr id="8" name="Rectangle 7">
+            <a:extLst>
+              <a:ext uri="{FF2B5EF4-FFF2-40B4-BE49-F238E27FC236}">
+                <a16:creationId xmlns:a16="http://schemas.microsoft.com/office/drawing/2014/main" id="{6676BFCD-4CA3-4401-B454-D77FF8A98A72}"/>
+              </a:ext>
+            </a:extLst>
+          </p:cNvPr>
+          <p:cNvSpPr/>
+          <p:nvPr/>
+        </p:nvSpPr>
+        <p:spPr>
+          <a:xfrm>
+            <a:off x="321609" y="2524378"/>
+            <a:ext cx="995898" cy="338266"/>
           </a:xfrm>
           <a:prstGeom prst="rect">
             <a:avLst/>
@@ -13068,27 +12700,27 @@
             <a:pPr algn="ctr"/>
             <a:r>
               <a:rPr lang="en-US" sz="1400"/>
-              <a:t>First name</a:t>
-            </a:r>
-          </a:p>
-        </p:txBody>
-      </p:sp>
-      <p:sp>
-        <p:nvSpPr>
-          <p:cNvPr id="8" name="Rectangle 7">
-            <a:extLst>
-              <a:ext uri="{FF2B5EF4-FFF2-40B4-BE49-F238E27FC236}">
-                <a16:creationId xmlns:a16="http://schemas.microsoft.com/office/drawing/2014/main" id="{6676BFCD-4CA3-4401-B454-D77FF8A98A72}"/>
-              </a:ext>
-            </a:extLst>
-          </p:cNvPr>
-          <p:cNvSpPr/>
-          <p:nvPr/>
-        </p:nvSpPr>
-        <p:spPr>
-          <a:xfrm>
-            <a:off x="321609" y="2524378"/>
-            <a:ext cx="995898" cy="338266"/>
+              <a:t>Sched ID</a:t>
+            </a:r>
+          </a:p>
+        </p:txBody>
+      </p:sp>
+      <p:sp>
+        <p:nvSpPr>
+          <p:cNvPr id="9" name="Rectangle 8">
+            <a:extLst>
+              <a:ext uri="{FF2B5EF4-FFF2-40B4-BE49-F238E27FC236}">
+                <a16:creationId xmlns:a16="http://schemas.microsoft.com/office/drawing/2014/main" id="{4C36CCE1-27C2-47E1-BDE9-A914861A542A}"/>
+              </a:ext>
+            </a:extLst>
+          </p:cNvPr>
+          <p:cNvSpPr/>
+          <p:nvPr/>
+        </p:nvSpPr>
+        <p:spPr>
+          <a:xfrm>
+            <a:off x="321609" y="3997430"/>
+            <a:ext cx="1012090" cy="338266"/>
           </a:xfrm>
           <a:prstGeom prst="rect">
             <a:avLst/>
@@ -13115,26 +12747,26 @@
             <a:pPr algn="ctr"/>
             <a:r>
               <a:rPr lang="en-US" sz="1400"/>
-              <a:t>Sched ID</a:t>
-            </a:r>
-          </a:p>
-        </p:txBody>
-      </p:sp>
-      <p:sp>
-        <p:nvSpPr>
-          <p:cNvPr id="9" name="Rectangle 8">
-            <a:extLst>
-              <a:ext uri="{FF2B5EF4-FFF2-40B4-BE49-F238E27FC236}">
-                <a16:creationId xmlns:a16="http://schemas.microsoft.com/office/drawing/2014/main" id="{4C36CCE1-27C2-47E1-BDE9-A914861A542A}"/>
-              </a:ext>
-            </a:extLst>
-          </p:cNvPr>
-          <p:cNvSpPr/>
-          <p:nvPr/>
-        </p:nvSpPr>
-        <p:spPr>
-          <a:xfrm>
-            <a:off x="321609" y="3997430"/>
+              <a:t>To</a:t>
+            </a:r>
+          </a:p>
+        </p:txBody>
+      </p:sp>
+      <p:sp>
+        <p:nvSpPr>
+          <p:cNvPr id="10" name="Rectangle 9">
+            <a:extLst>
+              <a:ext uri="{FF2B5EF4-FFF2-40B4-BE49-F238E27FC236}">
+                <a16:creationId xmlns:a16="http://schemas.microsoft.com/office/drawing/2014/main" id="{843BE703-94CE-4448-B367-F5DBE92E5A21}"/>
+              </a:ext>
+            </a:extLst>
+          </p:cNvPr>
+          <p:cNvSpPr/>
+          <p:nvPr/>
+        </p:nvSpPr>
+        <p:spPr>
+          <a:xfrm>
+            <a:off x="321609" y="3456522"/>
             <a:ext cx="1012090" cy="338266"/>
           </a:xfrm>
           <a:prstGeom prst="rect">
@@ -13162,27 +12794,27 @@
             <a:pPr algn="ctr"/>
             <a:r>
               <a:rPr lang="en-US" sz="1400"/>
-              <a:t>To</a:t>
-            </a:r>
-          </a:p>
-        </p:txBody>
-      </p:sp>
-      <p:sp>
-        <p:nvSpPr>
-          <p:cNvPr id="10" name="Rectangle 9">
-            <a:extLst>
-              <a:ext uri="{FF2B5EF4-FFF2-40B4-BE49-F238E27FC236}">
-                <a16:creationId xmlns:a16="http://schemas.microsoft.com/office/drawing/2014/main" id="{843BE703-94CE-4448-B367-F5DBE92E5A21}"/>
-              </a:ext>
-            </a:extLst>
-          </p:cNvPr>
-          <p:cNvSpPr/>
-          <p:nvPr/>
-        </p:nvSpPr>
-        <p:spPr>
-          <a:xfrm>
-            <a:off x="321609" y="3456522"/>
-            <a:ext cx="1012090" cy="338266"/>
+              <a:t>From</a:t>
+            </a:r>
+          </a:p>
+        </p:txBody>
+      </p:sp>
+      <p:sp>
+        <p:nvSpPr>
+          <p:cNvPr id="11" name="Rectangle 10">
+            <a:extLst>
+              <a:ext uri="{FF2B5EF4-FFF2-40B4-BE49-F238E27FC236}">
+                <a16:creationId xmlns:a16="http://schemas.microsoft.com/office/drawing/2014/main" id="{C7FF2387-9D28-4BCA-9A73-D405644BC1C1}"/>
+              </a:ext>
+            </a:extLst>
+          </p:cNvPr>
+          <p:cNvSpPr/>
+          <p:nvPr/>
+        </p:nvSpPr>
+        <p:spPr>
+          <a:xfrm>
+            <a:off x="321609" y="1236628"/>
+            <a:ext cx="1020581" cy="332193"/>
           </a:xfrm>
           <a:prstGeom prst="rect">
             <a:avLst/>
@@ -13209,27 +12841,27 @@
             <a:pPr algn="ctr"/>
             <a:r>
               <a:rPr lang="en-US" sz="1400"/>
-              <a:t>From</a:t>
-            </a:r>
-          </a:p>
-        </p:txBody>
-      </p:sp>
-      <p:sp>
-        <p:nvSpPr>
-          <p:cNvPr id="11" name="Rectangle 10">
-            <a:extLst>
-              <a:ext uri="{FF2B5EF4-FFF2-40B4-BE49-F238E27FC236}">
-                <a16:creationId xmlns:a16="http://schemas.microsoft.com/office/drawing/2014/main" id="{C7FF2387-9D28-4BCA-9A73-D405644BC1C1}"/>
-              </a:ext>
-            </a:extLst>
-          </p:cNvPr>
-          <p:cNvSpPr/>
-          <p:nvPr/>
-        </p:nvSpPr>
-        <p:spPr>
-          <a:xfrm>
-            <a:off x="3462006" y="1236725"/>
-            <a:ext cx="1020581" cy="332193"/>
+              <a:t>Agency</a:t>
+            </a:r>
+          </a:p>
+        </p:txBody>
+      </p:sp>
+      <p:sp>
+        <p:nvSpPr>
+          <p:cNvPr id="12" name="Rectangle 11">
+            <a:extLst>
+              <a:ext uri="{FF2B5EF4-FFF2-40B4-BE49-F238E27FC236}">
+                <a16:creationId xmlns:a16="http://schemas.microsoft.com/office/drawing/2014/main" id="{3CCD1C28-5DF6-44EB-920C-EC57152A0D8B}"/>
+              </a:ext>
+            </a:extLst>
+          </p:cNvPr>
+          <p:cNvSpPr/>
+          <p:nvPr/>
+        </p:nvSpPr>
+        <p:spPr>
+          <a:xfrm>
+            <a:off x="3451848" y="2004881"/>
+            <a:ext cx="1020582" cy="360802"/>
           </a:xfrm>
           <a:prstGeom prst="rect">
             <a:avLst/>
@@ -13256,27 +12888,27 @@
             <a:pPr algn="ctr"/>
             <a:r>
               <a:rPr lang="en-US" sz="1400"/>
-              <a:t>Agency</a:t>
-            </a:r>
-          </a:p>
-        </p:txBody>
-      </p:sp>
-      <p:sp>
-        <p:nvSpPr>
-          <p:cNvPr id="12" name="Rectangle 11">
-            <a:extLst>
-              <a:ext uri="{FF2B5EF4-FFF2-40B4-BE49-F238E27FC236}">
-                <a16:creationId xmlns:a16="http://schemas.microsoft.com/office/drawing/2014/main" id="{3CCD1C28-5DF6-44EB-920C-EC57152A0D8B}"/>
-              </a:ext>
-            </a:extLst>
-          </p:cNvPr>
-          <p:cNvSpPr/>
-          <p:nvPr/>
-        </p:nvSpPr>
-        <p:spPr>
-          <a:xfrm>
-            <a:off x="3451848" y="2004881"/>
-            <a:ext cx="1020582" cy="360802"/>
+              <a:t>Last name</a:t>
+            </a:r>
+          </a:p>
+        </p:txBody>
+      </p:sp>
+      <p:sp>
+        <p:nvSpPr>
+          <p:cNvPr id="13" name="Rectangle 12">
+            <a:extLst>
+              <a:ext uri="{FF2B5EF4-FFF2-40B4-BE49-F238E27FC236}">
+                <a16:creationId xmlns:a16="http://schemas.microsoft.com/office/drawing/2014/main" id="{868D2B36-8FE5-448A-BDC8-06396EB03A3F}"/>
+              </a:ext>
+            </a:extLst>
+          </p:cNvPr>
+          <p:cNvSpPr/>
+          <p:nvPr/>
+        </p:nvSpPr>
+        <p:spPr>
+          <a:xfrm>
+            <a:off x="3431202" y="2494122"/>
+            <a:ext cx="1035193" cy="375213"/>
           </a:xfrm>
           <a:prstGeom prst="rect">
             <a:avLst/>
@@ -13303,27 +12935,74 @@
             <a:pPr algn="ctr"/>
             <a:r>
               <a:rPr lang="en-US" sz="1400"/>
-              <a:t>Last name</a:t>
-            </a:r>
-          </a:p>
-        </p:txBody>
-      </p:sp>
-      <p:sp>
-        <p:nvSpPr>
-          <p:cNvPr id="13" name="Rectangle 12">
-            <a:extLst>
-              <a:ext uri="{FF2B5EF4-FFF2-40B4-BE49-F238E27FC236}">
-                <a16:creationId xmlns:a16="http://schemas.microsoft.com/office/drawing/2014/main" id="{868D2B36-8FE5-448A-BDC8-06396EB03A3F}"/>
-              </a:ext>
-            </a:extLst>
-          </p:cNvPr>
-          <p:cNvSpPr/>
-          <p:nvPr/>
-        </p:nvSpPr>
-        <p:spPr>
-          <a:xfrm>
-            <a:off x="3431202" y="2494122"/>
-            <a:ext cx="1035193" cy="375213"/>
+              <a:t>Service</a:t>
+            </a:r>
+          </a:p>
+        </p:txBody>
+      </p:sp>
+      <p:sp>
+        <p:nvSpPr>
+          <p:cNvPr id="18" name="Rectangle 17">
+            <a:extLst>
+              <a:ext uri="{FF2B5EF4-FFF2-40B4-BE49-F238E27FC236}">
+                <a16:creationId xmlns:a16="http://schemas.microsoft.com/office/drawing/2014/main" id="{CC900875-9094-414F-800C-ED9618E8058F}"/>
+              </a:ext>
+            </a:extLst>
+          </p:cNvPr>
+          <p:cNvSpPr/>
+          <p:nvPr/>
+        </p:nvSpPr>
+        <p:spPr>
+          <a:xfrm>
+            <a:off x="1716650" y="1235117"/>
+            <a:ext cx="1190981" cy="347506"/>
+          </a:xfrm>
+          <a:prstGeom prst="rect">
+            <a:avLst/>
+          </a:prstGeom>
+        </p:spPr>
+        <p:style>
+          <a:lnRef idx="1">
+            <a:schemeClr val="accent3"/>
+          </a:lnRef>
+          <a:fillRef idx="2">
+            <a:schemeClr val="accent3"/>
+          </a:fillRef>
+          <a:effectRef idx="1">
+            <a:schemeClr val="accent3"/>
+          </a:effectRef>
+          <a:fontRef idx="minor">
+            <a:schemeClr val="dk1"/>
+          </a:fontRef>
+        </p:style>
+        <p:txBody>
+          <a:bodyPr rtlCol="0" anchor="ctr"/>
+          <a:lstStyle/>
+          <a:p>
+            <a:pPr algn="ctr"/>
+            <a:r>
+              <a:rPr lang="en-US" sz="1200"/>
+              <a:t>JASA</a:t>
+            </a:r>
+          </a:p>
+        </p:txBody>
+      </p:sp>
+      <p:sp>
+        <p:nvSpPr>
+          <p:cNvPr id="19" name="Rectangle 18">
+            <a:extLst>
+              <a:ext uri="{FF2B5EF4-FFF2-40B4-BE49-F238E27FC236}">
+                <a16:creationId xmlns:a16="http://schemas.microsoft.com/office/drawing/2014/main" id="{CEE1AD42-0C03-495D-8F23-F33499C0A6EF}"/>
+              </a:ext>
+            </a:extLst>
+          </p:cNvPr>
+          <p:cNvSpPr/>
+          <p:nvPr/>
+        </p:nvSpPr>
+        <p:spPr>
+          <a:xfrm>
+            <a:off x="2736640" y="1237580"/>
+            <a:ext cx="244234" cy="332513"/>
           </a:xfrm>
           <a:prstGeom prst="rect">
             <a:avLst/>
@@ -13348,243 +13027,12 @@
           <a:lstStyle/>
           <a:p>
             <a:pPr algn="ctr"/>
-            <a:r>
-              <a:rPr lang="en-US" sz="1400"/>
-              <a:t>Service</a:t>
-            </a:r>
-          </a:p>
-        </p:txBody>
-      </p:sp>
-      <p:sp>
-        <p:nvSpPr>
-          <p:cNvPr id="15" name="Rectangle 14">
-            <a:extLst>
-              <a:ext uri="{FF2B5EF4-FFF2-40B4-BE49-F238E27FC236}">
-                <a16:creationId xmlns:a16="http://schemas.microsoft.com/office/drawing/2014/main" id="{B17E0830-B6D5-4D53-9249-125783436C6D}"/>
-              </a:ext>
-            </a:extLst>
-          </p:cNvPr>
-          <p:cNvSpPr/>
-          <p:nvPr/>
-        </p:nvSpPr>
-        <p:spPr>
-          <a:xfrm>
-            <a:off x="1686426" y="1247946"/>
-            <a:ext cx="1310640" cy="338266"/>
-          </a:xfrm>
-          <a:prstGeom prst="rect">
-            <a:avLst/>
-          </a:prstGeom>
-        </p:spPr>
-        <p:style>
-          <a:lnRef idx="1">
-            <a:schemeClr val="accent3"/>
-          </a:lnRef>
-          <a:fillRef idx="2">
-            <a:schemeClr val="accent3"/>
-          </a:fillRef>
-          <a:effectRef idx="1">
-            <a:schemeClr val="accent3"/>
-          </a:effectRef>
-          <a:fontRef idx="minor">
-            <a:schemeClr val="dk1"/>
-          </a:fontRef>
-        </p:style>
-        <p:txBody>
-          <a:bodyPr rtlCol="0" anchor="ctr"/>
-          <a:lstStyle/>
-          <a:p>
-            <a:pPr algn="ctr"/>
-            <a:r>
-              <a:rPr lang="en-US" sz="1200"/>
-              <a:t>TL</a:t>
-            </a:r>
-          </a:p>
-        </p:txBody>
-      </p:sp>
-      <p:sp>
-        <p:nvSpPr>
-          <p:cNvPr id="16" name="Rectangle 15">
-            <a:extLst>
-              <a:ext uri="{FF2B5EF4-FFF2-40B4-BE49-F238E27FC236}">
-                <a16:creationId xmlns:a16="http://schemas.microsoft.com/office/drawing/2014/main" id="{80C3F056-1057-49DA-9124-1CD80474C8FD}"/>
-              </a:ext>
-            </a:extLst>
-          </p:cNvPr>
-          <p:cNvSpPr/>
-          <p:nvPr/>
-        </p:nvSpPr>
-        <p:spPr>
-          <a:xfrm>
-            <a:off x="2826610" y="1247946"/>
-            <a:ext cx="168097" cy="327176"/>
-          </a:xfrm>
-          <a:prstGeom prst="rect">
-            <a:avLst/>
-          </a:prstGeom>
-        </p:spPr>
-        <p:style>
-          <a:lnRef idx="2">
-            <a:schemeClr val="accent6"/>
-          </a:lnRef>
-          <a:fillRef idx="1">
-            <a:schemeClr val="lt1"/>
-          </a:fillRef>
-          <a:effectRef idx="0">
-            <a:schemeClr val="accent6"/>
-          </a:effectRef>
-          <a:fontRef idx="minor">
-            <a:schemeClr val="dk1"/>
-          </a:fontRef>
-        </p:style>
-        <p:txBody>
-          <a:bodyPr rtlCol="0" anchor="ctr"/>
-          <a:lstStyle/>
-          <a:p>
-            <a:pPr algn="ctr"/>
             <a:endParaRPr lang="en-US"/>
           </a:p>
         </p:txBody>
       </p:sp>
       <p:sp>
         <p:nvSpPr>
-          <p:cNvPr id="17" name="Flowchart: Merge 16">
-            <a:extLst>
-              <a:ext uri="{FF2B5EF4-FFF2-40B4-BE49-F238E27FC236}">
-                <a16:creationId xmlns:a16="http://schemas.microsoft.com/office/drawing/2014/main" id="{638B81E3-A37F-4BFA-9FD4-7E8A91C2E92E}"/>
-              </a:ext>
-            </a:extLst>
-          </p:cNvPr>
-          <p:cNvSpPr/>
-          <p:nvPr/>
-        </p:nvSpPr>
-        <p:spPr>
-          <a:xfrm>
-            <a:off x="2872470" y="1424157"/>
-            <a:ext cx="93993" cy="103156"/>
-          </a:xfrm>
-          <a:prstGeom prst="flowChartMerge">
-            <a:avLst/>
-          </a:prstGeom>
-        </p:spPr>
-        <p:style>
-          <a:lnRef idx="2">
-            <a:schemeClr val="accent1">
-              <a:shade val="50000"/>
-            </a:schemeClr>
-          </a:lnRef>
-          <a:fillRef idx="1">
-            <a:schemeClr val="accent1"/>
-          </a:fillRef>
-          <a:effectRef idx="0">
-            <a:schemeClr val="accent1"/>
-          </a:effectRef>
-          <a:fontRef idx="minor">
-            <a:schemeClr val="lt1"/>
-          </a:fontRef>
-        </p:style>
-        <p:txBody>
-          <a:bodyPr rtlCol="0" anchor="ctr"/>
-          <a:lstStyle/>
-          <a:p>
-            <a:pPr algn="ctr"/>
-            <a:endParaRPr lang="en-US"/>
-          </a:p>
-        </p:txBody>
-      </p:sp>
-      <p:sp>
-        <p:nvSpPr>
-          <p:cNvPr id="18" name="Rectangle 17">
-            <a:extLst>
-              <a:ext uri="{FF2B5EF4-FFF2-40B4-BE49-F238E27FC236}">
-                <a16:creationId xmlns:a16="http://schemas.microsoft.com/office/drawing/2014/main" id="{CC900875-9094-414F-800C-ED9618E8058F}"/>
-              </a:ext>
-            </a:extLst>
-          </p:cNvPr>
-          <p:cNvSpPr/>
-          <p:nvPr/>
-        </p:nvSpPr>
-        <p:spPr>
-          <a:xfrm>
-            <a:off x="4732472" y="1233942"/>
-            <a:ext cx="1190981" cy="347506"/>
-          </a:xfrm>
-          <a:prstGeom prst="rect">
-            <a:avLst/>
-          </a:prstGeom>
-        </p:spPr>
-        <p:style>
-          <a:lnRef idx="1">
-            <a:schemeClr val="accent3"/>
-          </a:lnRef>
-          <a:fillRef idx="2">
-            <a:schemeClr val="accent3"/>
-          </a:fillRef>
-          <a:effectRef idx="1">
-            <a:schemeClr val="accent3"/>
-          </a:effectRef>
-          <a:fontRef idx="minor">
-            <a:schemeClr val="dk1"/>
-          </a:fontRef>
-        </p:style>
-        <p:txBody>
-          <a:bodyPr rtlCol="0" anchor="ctr"/>
-          <a:lstStyle/>
-          <a:p>
-            <a:pPr algn="ctr"/>
-            <a:r>
-              <a:rPr lang="en-US" sz="1200"/>
-              <a:t>Home Health</a:t>
-            </a:r>
-          </a:p>
-        </p:txBody>
-      </p:sp>
-      <p:sp>
-        <p:nvSpPr>
-          <p:cNvPr id="19" name="Rectangle 18">
-            <a:extLst>
-              <a:ext uri="{FF2B5EF4-FFF2-40B4-BE49-F238E27FC236}">
-                <a16:creationId xmlns:a16="http://schemas.microsoft.com/office/drawing/2014/main" id="{CEE1AD42-0C03-495D-8F23-F33499C0A6EF}"/>
-              </a:ext>
-            </a:extLst>
-          </p:cNvPr>
-          <p:cNvSpPr/>
-          <p:nvPr/>
-        </p:nvSpPr>
-        <p:spPr>
-          <a:xfrm>
-            <a:off x="5752462" y="1236405"/>
-            <a:ext cx="170991" cy="332513"/>
-          </a:xfrm>
-          <a:prstGeom prst="rect">
-            <a:avLst/>
-          </a:prstGeom>
-        </p:spPr>
-        <p:style>
-          <a:lnRef idx="2">
-            <a:schemeClr val="accent6"/>
-          </a:lnRef>
-          <a:fillRef idx="1">
-            <a:schemeClr val="lt1"/>
-          </a:fillRef>
-          <a:effectRef idx="0">
-            <a:schemeClr val="accent6"/>
-          </a:effectRef>
-          <a:fontRef idx="minor">
-            <a:schemeClr val="dk1"/>
-          </a:fontRef>
-        </p:style>
-        <p:txBody>
-          <a:bodyPr rtlCol="0" anchor="ctr"/>
-          <a:lstStyle/>
-          <a:p>
-            <a:pPr algn="ctr"/>
-            <a:endParaRPr lang="en-US"/>
-          </a:p>
-        </p:txBody>
-      </p:sp>
-      <p:sp>
-        <p:nvSpPr>
           <p:cNvPr id="20" name="Flowchart: Merge 19">
             <a:extLst>
               <a:ext uri="{FF2B5EF4-FFF2-40B4-BE49-F238E27FC236}">
@@ -13597,7 +13045,7 @@
         </p:nvSpPr>
         <p:spPr>
           <a:xfrm>
-            <a:off x="5802569" y="1407580"/>
+            <a:off x="2821392" y="1412311"/>
             <a:ext cx="74730" cy="110837"/>
           </a:xfrm>
           <a:prstGeom prst="flowChartMerge">
@@ -15278,7 +14726,7 @@
             <a:pPr algn="ctr"/>
             <a:r>
               <a:rPr lang="en-US" sz="1400"/>
-              <a:t>Client</a:t>
+              <a:t>Patients</a:t>
             </a:r>
           </a:p>
         </p:txBody>
@@ -15324,8 +14772,8 @@
           <a:p>
             <a:pPr algn="ctr"/>
             <a:r>
-              <a:rPr lang="en-US" sz="1400"/>
-              <a:t>Authorization</a:t>
+              <a:rPr lang="en-US" sz="1300"/>
+              <a:t>Authorizations</a:t>
             </a:r>
           </a:p>
         </p:txBody>
@@ -15419,7 +14867,7 @@
             <a:pPr algn="ctr"/>
             <a:r>
               <a:rPr lang="en-US" sz="1400"/>
-              <a:t>Billing</a:t>
+              <a:t>Billings</a:t>
             </a:r>
           </a:p>
         </p:txBody>
@@ -15516,7 +14964,7 @@
             <a:pPr algn="ctr"/>
             <a:r>
               <a:rPr lang="en-US" sz="1400" b="1" u="sng"/>
-              <a:t>Client</a:t>
+              <a:t>Patient</a:t>
             </a:r>
           </a:p>
         </p:txBody>
@@ -15717,8 +15165,8 @@
         </p:nvSpPr>
         <p:spPr>
           <a:xfrm>
-            <a:off x="6341160" y="1681436"/>
-            <a:ext cx="788432" cy="225453"/>
+            <a:off x="6341159" y="1681436"/>
+            <a:ext cx="1033495" cy="225453"/>
           </a:xfrm>
           <a:prstGeom prst="rect">
             <a:avLst/>
@@ -15748,7 +15196,7 @@
             <a:pPr algn="ctr"/>
             <a:r>
               <a:rPr lang="en-US" sz="1400" b="1" u="sng"/>
-              <a:t>Staff</a:t>
+              <a:t>Caregiver</a:t>
             </a:r>
           </a:p>
         </p:txBody>
@@ -15958,19 +15406,19 @@
       </p:grpSpPr>
       <p:sp>
         <p:nvSpPr>
-          <p:cNvPr id="6" name="Rectangle 5">
-            <a:extLst>
-              <a:ext uri="{FF2B5EF4-FFF2-40B4-BE49-F238E27FC236}">
-                <a16:creationId xmlns:a16="http://schemas.microsoft.com/office/drawing/2014/main" id="{DF2B91E9-EED4-4DD8-9263-1C184BC2C671}"/>
-              </a:ext>
-            </a:extLst>
-          </p:cNvPr>
-          <p:cNvSpPr/>
-          <p:nvPr/>
-        </p:nvSpPr>
-        <p:spPr>
-          <a:xfrm>
-            <a:off x="323272" y="1237673"/>
+          <p:cNvPr id="7" name="Rectangle 6">
+            <a:extLst>
+              <a:ext uri="{FF2B5EF4-FFF2-40B4-BE49-F238E27FC236}">
+                <a16:creationId xmlns:a16="http://schemas.microsoft.com/office/drawing/2014/main" id="{D6BAFB21-A5ED-4D97-A21B-7037E5B62055}"/>
+              </a:ext>
+            </a:extLst>
+          </p:cNvPr>
+          <p:cNvSpPr/>
+          <p:nvPr/>
+        </p:nvSpPr>
+        <p:spPr>
+          <a:xfrm>
+            <a:off x="313116" y="1993406"/>
             <a:ext cx="1310639" cy="338266"/>
           </a:xfrm>
           <a:prstGeom prst="rect">
@@ -15998,27 +15446,27 @@
             <a:pPr algn="ctr"/>
             <a:r>
               <a:rPr lang="en-US" sz="1400"/>
-              <a:t>Jurisdiction</a:t>
-            </a:r>
-          </a:p>
-        </p:txBody>
-      </p:sp>
-      <p:sp>
-        <p:nvSpPr>
-          <p:cNvPr id="7" name="Rectangle 6">
-            <a:extLst>
-              <a:ext uri="{FF2B5EF4-FFF2-40B4-BE49-F238E27FC236}">
-                <a16:creationId xmlns:a16="http://schemas.microsoft.com/office/drawing/2014/main" id="{D6BAFB21-A5ED-4D97-A21B-7037E5B62055}"/>
-              </a:ext>
-            </a:extLst>
-          </p:cNvPr>
-          <p:cNvSpPr/>
-          <p:nvPr/>
-        </p:nvSpPr>
-        <p:spPr>
-          <a:xfrm>
-            <a:off x="313116" y="1993406"/>
-            <a:ext cx="1310639" cy="338266"/>
+              <a:t>First name</a:t>
+            </a:r>
+          </a:p>
+        </p:txBody>
+      </p:sp>
+      <p:sp>
+        <p:nvSpPr>
+          <p:cNvPr id="8" name="Rectangle 7">
+            <a:extLst>
+              <a:ext uri="{FF2B5EF4-FFF2-40B4-BE49-F238E27FC236}">
+                <a16:creationId xmlns:a16="http://schemas.microsoft.com/office/drawing/2014/main" id="{6676BFCD-4CA3-4401-B454-D77FF8A98A72}"/>
+              </a:ext>
+            </a:extLst>
+          </p:cNvPr>
+          <p:cNvSpPr/>
+          <p:nvPr/>
+        </p:nvSpPr>
+        <p:spPr>
+          <a:xfrm>
+            <a:off x="321608" y="2524378"/>
+            <a:ext cx="1302147" cy="338266"/>
           </a:xfrm>
           <a:prstGeom prst="rect">
             <a:avLst/>
@@ -16045,27 +15493,27 @@
             <a:pPr algn="ctr"/>
             <a:r>
               <a:rPr lang="en-US" sz="1400"/>
-              <a:t>First name</a:t>
-            </a:r>
-          </a:p>
-        </p:txBody>
-      </p:sp>
-      <p:sp>
-        <p:nvSpPr>
-          <p:cNvPr id="8" name="Rectangle 7">
-            <a:extLst>
-              <a:ext uri="{FF2B5EF4-FFF2-40B4-BE49-F238E27FC236}">
-                <a16:creationId xmlns:a16="http://schemas.microsoft.com/office/drawing/2014/main" id="{6676BFCD-4CA3-4401-B454-D77FF8A98A72}"/>
-              </a:ext>
-            </a:extLst>
-          </p:cNvPr>
-          <p:cNvSpPr/>
-          <p:nvPr/>
-        </p:nvSpPr>
-        <p:spPr>
-          <a:xfrm>
-            <a:off x="321608" y="2524378"/>
-            <a:ext cx="1302147" cy="338266"/>
+              <a:t>Billing Sched ID</a:t>
+            </a:r>
+          </a:p>
+        </p:txBody>
+      </p:sp>
+      <p:sp>
+        <p:nvSpPr>
+          <p:cNvPr id="9" name="Rectangle 8">
+            <a:extLst>
+              <a:ext uri="{FF2B5EF4-FFF2-40B4-BE49-F238E27FC236}">
+                <a16:creationId xmlns:a16="http://schemas.microsoft.com/office/drawing/2014/main" id="{4C36CCE1-27C2-47E1-BDE9-A914861A542A}"/>
+              </a:ext>
+            </a:extLst>
+          </p:cNvPr>
+          <p:cNvSpPr/>
+          <p:nvPr/>
+        </p:nvSpPr>
+        <p:spPr>
+          <a:xfrm>
+            <a:off x="321609" y="3997430"/>
+            <a:ext cx="1012090" cy="338266"/>
           </a:xfrm>
           <a:prstGeom prst="rect">
             <a:avLst/>
@@ -16092,26 +15540,26 @@
             <a:pPr algn="ctr"/>
             <a:r>
               <a:rPr lang="en-US" sz="1400"/>
-              <a:t>Billing Sched ID</a:t>
-            </a:r>
-          </a:p>
-        </p:txBody>
-      </p:sp>
-      <p:sp>
-        <p:nvSpPr>
-          <p:cNvPr id="9" name="Rectangle 8">
-            <a:extLst>
-              <a:ext uri="{FF2B5EF4-FFF2-40B4-BE49-F238E27FC236}">
-                <a16:creationId xmlns:a16="http://schemas.microsoft.com/office/drawing/2014/main" id="{4C36CCE1-27C2-47E1-BDE9-A914861A542A}"/>
-              </a:ext>
-            </a:extLst>
-          </p:cNvPr>
-          <p:cNvSpPr/>
-          <p:nvPr/>
-        </p:nvSpPr>
-        <p:spPr>
-          <a:xfrm>
-            <a:off x="321609" y="3997430"/>
+              <a:t>To</a:t>
+            </a:r>
+          </a:p>
+        </p:txBody>
+      </p:sp>
+      <p:sp>
+        <p:nvSpPr>
+          <p:cNvPr id="10" name="Rectangle 9">
+            <a:extLst>
+              <a:ext uri="{FF2B5EF4-FFF2-40B4-BE49-F238E27FC236}">
+                <a16:creationId xmlns:a16="http://schemas.microsoft.com/office/drawing/2014/main" id="{843BE703-94CE-4448-B367-F5DBE92E5A21}"/>
+              </a:ext>
+            </a:extLst>
+          </p:cNvPr>
+          <p:cNvSpPr/>
+          <p:nvPr/>
+        </p:nvSpPr>
+        <p:spPr>
+          <a:xfrm>
+            <a:off x="321609" y="3456522"/>
             <a:ext cx="1012090" cy="338266"/>
           </a:xfrm>
           <a:prstGeom prst="rect">
@@ -16139,27 +15587,27 @@
             <a:pPr algn="ctr"/>
             <a:r>
               <a:rPr lang="en-US" sz="1400"/>
-              <a:t>To</a:t>
-            </a:r>
-          </a:p>
-        </p:txBody>
-      </p:sp>
-      <p:sp>
-        <p:nvSpPr>
-          <p:cNvPr id="10" name="Rectangle 9">
-            <a:extLst>
-              <a:ext uri="{FF2B5EF4-FFF2-40B4-BE49-F238E27FC236}">
-                <a16:creationId xmlns:a16="http://schemas.microsoft.com/office/drawing/2014/main" id="{843BE703-94CE-4448-B367-F5DBE92E5A21}"/>
-              </a:ext>
-            </a:extLst>
-          </p:cNvPr>
-          <p:cNvSpPr/>
-          <p:nvPr/>
-        </p:nvSpPr>
-        <p:spPr>
-          <a:xfrm>
-            <a:off x="321609" y="3456522"/>
-            <a:ext cx="1012090" cy="338266"/>
+              <a:t>From</a:t>
+            </a:r>
+          </a:p>
+        </p:txBody>
+      </p:sp>
+      <p:sp>
+        <p:nvSpPr>
+          <p:cNvPr id="11" name="Rectangle 10">
+            <a:extLst>
+              <a:ext uri="{FF2B5EF4-FFF2-40B4-BE49-F238E27FC236}">
+                <a16:creationId xmlns:a16="http://schemas.microsoft.com/office/drawing/2014/main" id="{C7FF2387-9D28-4BCA-9A73-D405644BC1C1}"/>
+              </a:ext>
+            </a:extLst>
+          </p:cNvPr>
+          <p:cNvSpPr/>
+          <p:nvPr/>
+        </p:nvSpPr>
+        <p:spPr>
+          <a:xfrm>
+            <a:off x="299329" y="1360902"/>
+            <a:ext cx="1324426" cy="332193"/>
           </a:xfrm>
           <a:prstGeom prst="rect">
             <a:avLst/>
@@ -16186,27 +15634,27 @@
             <a:pPr algn="ctr"/>
             <a:r>
               <a:rPr lang="en-US" sz="1400"/>
-              <a:t>From</a:t>
-            </a:r>
-          </a:p>
-        </p:txBody>
-      </p:sp>
-      <p:sp>
-        <p:nvSpPr>
-          <p:cNvPr id="11" name="Rectangle 10">
-            <a:extLst>
-              <a:ext uri="{FF2B5EF4-FFF2-40B4-BE49-F238E27FC236}">
-                <a16:creationId xmlns:a16="http://schemas.microsoft.com/office/drawing/2014/main" id="{C7FF2387-9D28-4BCA-9A73-D405644BC1C1}"/>
-              </a:ext>
-            </a:extLst>
-          </p:cNvPr>
-          <p:cNvSpPr/>
-          <p:nvPr/>
-        </p:nvSpPr>
-        <p:spPr>
-          <a:xfrm>
-            <a:off x="3364768" y="1237251"/>
-            <a:ext cx="1324426" cy="332193"/>
+              <a:t>Agency</a:t>
+            </a:r>
+          </a:p>
+        </p:txBody>
+      </p:sp>
+      <p:sp>
+        <p:nvSpPr>
+          <p:cNvPr id="12" name="Rectangle 11">
+            <a:extLst>
+              <a:ext uri="{FF2B5EF4-FFF2-40B4-BE49-F238E27FC236}">
+                <a16:creationId xmlns:a16="http://schemas.microsoft.com/office/drawing/2014/main" id="{3CCD1C28-5DF6-44EB-920C-EC57152A0D8B}"/>
+              </a:ext>
+            </a:extLst>
+          </p:cNvPr>
+          <p:cNvSpPr/>
+          <p:nvPr/>
+        </p:nvSpPr>
+        <p:spPr>
+          <a:xfrm>
+            <a:off x="3349530" y="1990374"/>
+            <a:ext cx="1330255" cy="360802"/>
           </a:xfrm>
           <a:prstGeom prst="rect">
             <a:avLst/>
@@ -16233,27 +15681,27 @@
             <a:pPr algn="ctr"/>
             <a:r>
               <a:rPr lang="en-US" sz="1400"/>
-              <a:t>Agency</a:t>
-            </a:r>
-          </a:p>
-        </p:txBody>
-      </p:sp>
-      <p:sp>
-        <p:nvSpPr>
-          <p:cNvPr id="12" name="Rectangle 11">
-            <a:extLst>
-              <a:ext uri="{FF2B5EF4-FFF2-40B4-BE49-F238E27FC236}">
-                <a16:creationId xmlns:a16="http://schemas.microsoft.com/office/drawing/2014/main" id="{3CCD1C28-5DF6-44EB-920C-EC57152A0D8B}"/>
-              </a:ext>
-            </a:extLst>
-          </p:cNvPr>
-          <p:cNvSpPr/>
-          <p:nvPr/>
-        </p:nvSpPr>
-        <p:spPr>
-          <a:xfrm>
-            <a:off x="3349530" y="1990374"/>
-            <a:ext cx="1330255" cy="360802"/>
+              <a:t>Last name</a:t>
+            </a:r>
+          </a:p>
+        </p:txBody>
+      </p:sp>
+      <p:sp>
+        <p:nvSpPr>
+          <p:cNvPr id="13" name="Rectangle 12">
+            <a:extLst>
+              <a:ext uri="{FF2B5EF4-FFF2-40B4-BE49-F238E27FC236}">
+                <a16:creationId xmlns:a16="http://schemas.microsoft.com/office/drawing/2014/main" id="{868D2B36-8FE5-448A-BDC8-06396EB03A3F}"/>
+              </a:ext>
+            </a:extLst>
+          </p:cNvPr>
+          <p:cNvSpPr/>
+          <p:nvPr/>
+        </p:nvSpPr>
+        <p:spPr>
+          <a:xfrm>
+            <a:off x="3367681" y="2491865"/>
+            <a:ext cx="1318599" cy="375213"/>
           </a:xfrm>
           <a:prstGeom prst="rect">
             <a:avLst/>
@@ -16280,27 +15728,74 @@
             <a:pPr algn="ctr"/>
             <a:r>
               <a:rPr lang="en-US" sz="1400"/>
-              <a:t>Last name</a:t>
-            </a:r>
-          </a:p>
-        </p:txBody>
-      </p:sp>
-      <p:sp>
-        <p:nvSpPr>
-          <p:cNvPr id="13" name="Rectangle 12">
-            <a:extLst>
-              <a:ext uri="{FF2B5EF4-FFF2-40B4-BE49-F238E27FC236}">
-                <a16:creationId xmlns:a16="http://schemas.microsoft.com/office/drawing/2014/main" id="{868D2B36-8FE5-448A-BDC8-06396EB03A3F}"/>
-              </a:ext>
-            </a:extLst>
-          </p:cNvPr>
-          <p:cNvSpPr/>
-          <p:nvPr/>
-        </p:nvSpPr>
-        <p:spPr>
-          <a:xfrm>
-            <a:off x="3367681" y="2491865"/>
-            <a:ext cx="1318599" cy="375213"/>
+              <a:t>Invoice number</a:t>
+            </a:r>
+          </a:p>
+        </p:txBody>
+      </p:sp>
+      <p:sp>
+        <p:nvSpPr>
+          <p:cNvPr id="18" name="Rectangle 17">
+            <a:extLst>
+              <a:ext uri="{FF2B5EF4-FFF2-40B4-BE49-F238E27FC236}">
+                <a16:creationId xmlns:a16="http://schemas.microsoft.com/office/drawing/2014/main" id="{CC900875-9094-414F-800C-ED9618E8058F}"/>
+              </a:ext>
+            </a:extLst>
+          </p:cNvPr>
+          <p:cNvSpPr/>
+          <p:nvPr/>
+        </p:nvSpPr>
+        <p:spPr>
+          <a:xfrm>
+            <a:off x="1681499" y="1365757"/>
+            <a:ext cx="1311120" cy="347506"/>
+          </a:xfrm>
+          <a:prstGeom prst="rect">
+            <a:avLst/>
+          </a:prstGeom>
+        </p:spPr>
+        <p:style>
+          <a:lnRef idx="1">
+            <a:schemeClr val="accent3"/>
+          </a:lnRef>
+          <a:fillRef idx="2">
+            <a:schemeClr val="accent3"/>
+          </a:fillRef>
+          <a:effectRef idx="1">
+            <a:schemeClr val="accent3"/>
+          </a:effectRef>
+          <a:fontRef idx="minor">
+            <a:schemeClr val="dk1"/>
+          </a:fontRef>
+        </p:style>
+        <p:txBody>
+          <a:bodyPr rtlCol="0" anchor="ctr"/>
+          <a:lstStyle/>
+          <a:p>
+            <a:pPr algn="ctr"/>
+            <a:r>
+              <a:rPr lang="en-US" sz="1200"/>
+              <a:t>JASA</a:t>
+            </a:r>
+          </a:p>
+        </p:txBody>
+      </p:sp>
+      <p:sp>
+        <p:nvSpPr>
+          <p:cNvPr id="19" name="Rectangle 18">
+            <a:extLst>
+              <a:ext uri="{FF2B5EF4-FFF2-40B4-BE49-F238E27FC236}">
+                <a16:creationId xmlns:a16="http://schemas.microsoft.com/office/drawing/2014/main" id="{CEE1AD42-0C03-495D-8F23-F33499C0A6EF}"/>
+              </a:ext>
+            </a:extLst>
+          </p:cNvPr>
+          <p:cNvSpPr/>
+          <p:nvPr/>
+        </p:nvSpPr>
+        <p:spPr>
+          <a:xfrm>
+            <a:off x="2821627" y="1368220"/>
+            <a:ext cx="170991" cy="332513"/>
           </a:xfrm>
           <a:prstGeom prst="rect">
             <a:avLst/>
@@ -16325,243 +15820,12 @@
           <a:lstStyle/>
           <a:p>
             <a:pPr algn="ctr"/>
-            <a:r>
-              <a:rPr lang="en-US" sz="1400"/>
-              <a:t>Invoice number</a:t>
-            </a:r>
-          </a:p>
-        </p:txBody>
-      </p:sp>
-      <p:sp>
-        <p:nvSpPr>
-          <p:cNvPr id="15" name="Rectangle 14">
-            <a:extLst>
-              <a:ext uri="{FF2B5EF4-FFF2-40B4-BE49-F238E27FC236}">
-                <a16:creationId xmlns:a16="http://schemas.microsoft.com/office/drawing/2014/main" id="{B17E0830-B6D5-4D53-9249-125783436C6D}"/>
-              </a:ext>
-            </a:extLst>
-          </p:cNvPr>
-          <p:cNvSpPr/>
-          <p:nvPr/>
-        </p:nvSpPr>
-        <p:spPr>
-          <a:xfrm>
-            <a:off x="1686426" y="1247946"/>
-            <a:ext cx="1310640" cy="338266"/>
-          </a:xfrm>
-          <a:prstGeom prst="rect">
-            <a:avLst/>
-          </a:prstGeom>
-        </p:spPr>
-        <p:style>
-          <a:lnRef idx="1">
-            <a:schemeClr val="accent3"/>
-          </a:lnRef>
-          <a:fillRef idx="2">
-            <a:schemeClr val="accent3"/>
-          </a:fillRef>
-          <a:effectRef idx="1">
-            <a:schemeClr val="accent3"/>
-          </a:effectRef>
-          <a:fontRef idx="minor">
-            <a:schemeClr val="dk1"/>
-          </a:fontRef>
-        </p:style>
-        <p:txBody>
-          <a:bodyPr rtlCol="0" anchor="ctr"/>
-          <a:lstStyle/>
-          <a:p>
-            <a:pPr algn="ctr"/>
-            <a:r>
-              <a:rPr lang="en-US" sz="1200"/>
-              <a:t>TL</a:t>
-            </a:r>
-          </a:p>
-        </p:txBody>
-      </p:sp>
-      <p:sp>
-        <p:nvSpPr>
-          <p:cNvPr id="16" name="Rectangle 15">
-            <a:extLst>
-              <a:ext uri="{FF2B5EF4-FFF2-40B4-BE49-F238E27FC236}">
-                <a16:creationId xmlns:a16="http://schemas.microsoft.com/office/drawing/2014/main" id="{80C3F056-1057-49DA-9124-1CD80474C8FD}"/>
-              </a:ext>
-            </a:extLst>
-          </p:cNvPr>
-          <p:cNvSpPr/>
-          <p:nvPr/>
-        </p:nvSpPr>
-        <p:spPr>
-          <a:xfrm>
-            <a:off x="2826610" y="1247946"/>
-            <a:ext cx="168097" cy="327176"/>
-          </a:xfrm>
-          <a:prstGeom prst="rect">
-            <a:avLst/>
-          </a:prstGeom>
-        </p:spPr>
-        <p:style>
-          <a:lnRef idx="2">
-            <a:schemeClr val="accent6"/>
-          </a:lnRef>
-          <a:fillRef idx="1">
-            <a:schemeClr val="lt1"/>
-          </a:fillRef>
-          <a:effectRef idx="0">
-            <a:schemeClr val="accent6"/>
-          </a:effectRef>
-          <a:fontRef idx="minor">
-            <a:schemeClr val="dk1"/>
-          </a:fontRef>
-        </p:style>
-        <p:txBody>
-          <a:bodyPr rtlCol="0" anchor="ctr"/>
-          <a:lstStyle/>
-          <a:p>
-            <a:pPr algn="ctr"/>
             <a:endParaRPr lang="en-US"/>
           </a:p>
         </p:txBody>
       </p:sp>
       <p:sp>
         <p:nvSpPr>
-          <p:cNvPr id="17" name="Flowchart: Merge 16">
-            <a:extLst>
-              <a:ext uri="{FF2B5EF4-FFF2-40B4-BE49-F238E27FC236}">
-                <a16:creationId xmlns:a16="http://schemas.microsoft.com/office/drawing/2014/main" id="{638B81E3-A37F-4BFA-9FD4-7E8A91C2E92E}"/>
-              </a:ext>
-            </a:extLst>
-          </p:cNvPr>
-          <p:cNvSpPr/>
-          <p:nvPr/>
-        </p:nvSpPr>
-        <p:spPr>
-          <a:xfrm>
-            <a:off x="2872470" y="1424157"/>
-            <a:ext cx="93993" cy="103156"/>
-          </a:xfrm>
-          <a:prstGeom prst="flowChartMerge">
-            <a:avLst/>
-          </a:prstGeom>
-        </p:spPr>
-        <p:style>
-          <a:lnRef idx="2">
-            <a:schemeClr val="accent1">
-              <a:shade val="50000"/>
-            </a:schemeClr>
-          </a:lnRef>
-          <a:fillRef idx="1">
-            <a:schemeClr val="accent1"/>
-          </a:fillRef>
-          <a:effectRef idx="0">
-            <a:schemeClr val="accent1"/>
-          </a:effectRef>
-          <a:fontRef idx="minor">
-            <a:schemeClr val="lt1"/>
-          </a:fontRef>
-        </p:style>
-        <p:txBody>
-          <a:bodyPr rtlCol="0" anchor="ctr"/>
-          <a:lstStyle/>
-          <a:p>
-            <a:pPr algn="ctr"/>
-            <a:endParaRPr lang="en-US"/>
-          </a:p>
-        </p:txBody>
-      </p:sp>
-      <p:sp>
-        <p:nvSpPr>
-          <p:cNvPr id="18" name="Rectangle 17">
-            <a:extLst>
-              <a:ext uri="{FF2B5EF4-FFF2-40B4-BE49-F238E27FC236}">
-                <a16:creationId xmlns:a16="http://schemas.microsoft.com/office/drawing/2014/main" id="{CC900875-9094-414F-800C-ED9618E8058F}"/>
-              </a:ext>
-            </a:extLst>
-          </p:cNvPr>
-          <p:cNvSpPr/>
-          <p:nvPr/>
-        </p:nvSpPr>
-        <p:spPr>
-          <a:xfrm>
-            <a:off x="4867076" y="1242106"/>
-            <a:ext cx="1190981" cy="347506"/>
-          </a:xfrm>
-          <a:prstGeom prst="rect">
-            <a:avLst/>
-          </a:prstGeom>
-        </p:spPr>
-        <p:style>
-          <a:lnRef idx="1">
-            <a:schemeClr val="accent3"/>
-          </a:lnRef>
-          <a:fillRef idx="2">
-            <a:schemeClr val="accent3"/>
-          </a:fillRef>
-          <a:effectRef idx="1">
-            <a:schemeClr val="accent3"/>
-          </a:effectRef>
-          <a:fontRef idx="minor">
-            <a:schemeClr val="dk1"/>
-          </a:fontRef>
-        </p:style>
-        <p:txBody>
-          <a:bodyPr rtlCol="0" anchor="ctr"/>
-          <a:lstStyle/>
-          <a:p>
-            <a:pPr algn="ctr"/>
-            <a:r>
-              <a:rPr lang="en-US" sz="1200"/>
-              <a:t>Home Health</a:t>
-            </a:r>
-          </a:p>
-        </p:txBody>
-      </p:sp>
-      <p:sp>
-        <p:nvSpPr>
-          <p:cNvPr id="19" name="Rectangle 18">
-            <a:extLst>
-              <a:ext uri="{FF2B5EF4-FFF2-40B4-BE49-F238E27FC236}">
-                <a16:creationId xmlns:a16="http://schemas.microsoft.com/office/drawing/2014/main" id="{CEE1AD42-0C03-495D-8F23-F33499C0A6EF}"/>
-              </a:ext>
-            </a:extLst>
-          </p:cNvPr>
-          <p:cNvSpPr/>
-          <p:nvPr/>
-        </p:nvSpPr>
-        <p:spPr>
-          <a:xfrm>
-            <a:off x="5887066" y="1244569"/>
-            <a:ext cx="170991" cy="332513"/>
-          </a:xfrm>
-          <a:prstGeom prst="rect">
-            <a:avLst/>
-          </a:prstGeom>
-        </p:spPr>
-        <p:style>
-          <a:lnRef idx="2">
-            <a:schemeClr val="accent6"/>
-          </a:lnRef>
-          <a:fillRef idx="1">
-            <a:schemeClr val="lt1"/>
-          </a:fillRef>
-          <a:effectRef idx="0">
-            <a:schemeClr val="accent6"/>
-          </a:effectRef>
-          <a:fontRef idx="minor">
-            <a:schemeClr val="dk1"/>
-          </a:fontRef>
-        </p:style>
-        <p:txBody>
-          <a:bodyPr rtlCol="0" anchor="ctr"/>
-          <a:lstStyle/>
-          <a:p>
-            <a:pPr algn="ctr"/>
-            <a:endParaRPr lang="en-US"/>
-          </a:p>
-        </p:txBody>
-      </p:sp>
-      <p:sp>
-        <p:nvSpPr>
           <p:cNvPr id="20" name="Flowchart: Merge 19">
             <a:extLst>
               <a:ext uri="{FF2B5EF4-FFF2-40B4-BE49-F238E27FC236}">
@@ -16574,7 +15838,7 @@
         </p:nvSpPr>
         <p:spPr>
           <a:xfrm>
-            <a:off x="5937173" y="1415744"/>
+            <a:off x="2871734" y="1539395"/>
             <a:ext cx="74730" cy="110837"/>
           </a:xfrm>
           <a:prstGeom prst="flowChartMerge">
@@ -17838,7 +17102,7 @@
             <a:pPr algn="ctr"/>
             <a:r>
               <a:rPr lang="en-US" sz="1400"/>
-              <a:t>Client</a:t>
+              <a:t>Patients</a:t>
             </a:r>
           </a:p>
         </p:txBody>
@@ -17979,7 +17243,7 @@
             <a:pPr algn="ctr"/>
             <a:r>
               <a:rPr lang="en-US" sz="1400"/>
-              <a:t>Billing</a:t>
+              <a:t>Billings</a:t>
             </a:r>
           </a:p>
         </p:txBody>
@@ -18027,56 +17291,6 @@
             <a:r>
               <a:rPr lang="en-US" sz="1400"/>
               <a:t>Caregivers</a:t>
-            </a:r>
-          </a:p>
-        </p:txBody>
-      </p:sp>
-      <p:sp>
-        <p:nvSpPr>
-          <p:cNvPr id="58" name="Rectangle 57">
-            <a:extLst>
-              <a:ext uri="{FF2B5EF4-FFF2-40B4-BE49-F238E27FC236}">
-                <a16:creationId xmlns:a16="http://schemas.microsoft.com/office/drawing/2014/main" id="{BC499278-7357-45D3-A12F-3AFEEA5E6D12}"/>
-              </a:ext>
-            </a:extLst>
-          </p:cNvPr>
-          <p:cNvSpPr/>
-          <p:nvPr/>
-        </p:nvSpPr>
-        <p:spPr>
-          <a:xfrm>
-            <a:off x="252831" y="1674652"/>
-            <a:ext cx="788432" cy="225453"/>
-          </a:xfrm>
-          <a:prstGeom prst="rect">
-            <a:avLst/>
-          </a:prstGeom>
-          <a:ln>
-            <a:noFill/>
-          </a:ln>
-        </p:spPr>
-        <p:style>
-          <a:lnRef idx="2">
-            <a:schemeClr val="accent6"/>
-          </a:lnRef>
-          <a:fillRef idx="1">
-            <a:schemeClr val="lt1"/>
-          </a:fillRef>
-          <a:effectRef idx="0">
-            <a:schemeClr val="accent6"/>
-          </a:effectRef>
-          <a:fontRef idx="minor">
-            <a:schemeClr val="dk1"/>
-          </a:fontRef>
-        </p:style>
-        <p:txBody>
-          <a:bodyPr rtlCol="0" anchor="ctr"/>
-          <a:lstStyle/>
-          <a:p>
-            <a:pPr algn="ctr"/>
-            <a:r>
-              <a:rPr lang="en-US" sz="1400" b="1" u="sng"/>
-              <a:t>Client</a:t>
             </a:r>
           </a:p>
         </p:txBody>
@@ -18113,20 +17327,20 @@
       </p:grpSpPr>
       <p:sp>
         <p:nvSpPr>
-          <p:cNvPr id="6" name="Rectangle 5">
-            <a:extLst>
-              <a:ext uri="{FF2B5EF4-FFF2-40B4-BE49-F238E27FC236}">
-                <a16:creationId xmlns:a16="http://schemas.microsoft.com/office/drawing/2014/main" id="{DF2B91E9-EED4-4DD8-9263-1C184BC2C671}"/>
-              </a:ext>
-            </a:extLst>
-          </p:cNvPr>
-          <p:cNvSpPr/>
-          <p:nvPr/>
-        </p:nvSpPr>
-        <p:spPr>
-          <a:xfrm>
-            <a:off x="323272" y="1237673"/>
-            <a:ext cx="1380915" cy="338266"/>
+          <p:cNvPr id="7" name="Rectangle 6">
+            <a:extLst>
+              <a:ext uri="{FF2B5EF4-FFF2-40B4-BE49-F238E27FC236}">
+                <a16:creationId xmlns:a16="http://schemas.microsoft.com/office/drawing/2014/main" id="{D6BAFB21-A5ED-4D97-A21B-7037E5B62055}"/>
+              </a:ext>
+            </a:extLst>
+          </p:cNvPr>
+          <p:cNvSpPr/>
+          <p:nvPr/>
+        </p:nvSpPr>
+        <p:spPr>
+          <a:xfrm>
+            <a:off x="323273" y="1716827"/>
+            <a:ext cx="1380914" cy="338266"/>
           </a:xfrm>
           <a:prstGeom prst="rect">
             <a:avLst/>
@@ -18153,26 +17367,26 @@
             <a:pPr algn="ctr"/>
             <a:r>
               <a:rPr lang="en-US" sz="1400"/>
-              <a:t>Jurisdiction</a:t>
-            </a:r>
-          </a:p>
-        </p:txBody>
-      </p:sp>
-      <p:sp>
-        <p:nvSpPr>
-          <p:cNvPr id="7" name="Rectangle 6">
-            <a:extLst>
-              <a:ext uri="{FF2B5EF4-FFF2-40B4-BE49-F238E27FC236}">
-                <a16:creationId xmlns:a16="http://schemas.microsoft.com/office/drawing/2014/main" id="{D6BAFB21-A5ED-4D97-A21B-7037E5B62055}"/>
-              </a:ext>
-            </a:extLst>
-          </p:cNvPr>
-          <p:cNvSpPr/>
-          <p:nvPr/>
-        </p:nvSpPr>
-        <p:spPr>
-          <a:xfrm>
-            <a:off x="323273" y="1716827"/>
+              <a:t>First name</a:t>
+            </a:r>
+          </a:p>
+        </p:txBody>
+      </p:sp>
+      <p:sp>
+        <p:nvSpPr>
+          <p:cNvPr id="8" name="Rectangle 7">
+            <a:extLst>
+              <a:ext uri="{FF2B5EF4-FFF2-40B4-BE49-F238E27FC236}">
+                <a16:creationId xmlns:a16="http://schemas.microsoft.com/office/drawing/2014/main" id="{6676BFCD-4CA3-4401-B454-D77FF8A98A72}"/>
+              </a:ext>
+            </a:extLst>
+          </p:cNvPr>
+          <p:cNvSpPr/>
+          <p:nvPr/>
+        </p:nvSpPr>
+        <p:spPr>
+          <a:xfrm>
+            <a:off x="323272" y="2219609"/>
             <a:ext cx="1380914" cy="338266"/>
           </a:xfrm>
           <a:prstGeom prst="rect">
@@ -18200,27 +17414,27 @@
             <a:pPr algn="ctr"/>
             <a:r>
               <a:rPr lang="en-US" sz="1400"/>
-              <a:t>First name</a:t>
-            </a:r>
-          </a:p>
-        </p:txBody>
-      </p:sp>
-      <p:sp>
-        <p:nvSpPr>
-          <p:cNvPr id="8" name="Rectangle 7">
-            <a:extLst>
-              <a:ext uri="{FF2B5EF4-FFF2-40B4-BE49-F238E27FC236}">
-                <a16:creationId xmlns:a16="http://schemas.microsoft.com/office/drawing/2014/main" id="{6676BFCD-4CA3-4401-B454-D77FF8A98A72}"/>
-              </a:ext>
-            </a:extLst>
-          </p:cNvPr>
-          <p:cNvSpPr/>
-          <p:nvPr/>
-        </p:nvSpPr>
-        <p:spPr>
-          <a:xfrm>
-            <a:off x="323272" y="2219609"/>
-            <a:ext cx="1380914" cy="338266"/>
+              <a:t>Caregiver ID</a:t>
+            </a:r>
+          </a:p>
+        </p:txBody>
+      </p:sp>
+      <p:sp>
+        <p:nvSpPr>
+          <p:cNvPr id="11" name="Rectangle 10">
+            <a:extLst>
+              <a:ext uri="{FF2B5EF4-FFF2-40B4-BE49-F238E27FC236}">
+                <a16:creationId xmlns:a16="http://schemas.microsoft.com/office/drawing/2014/main" id="{C7FF2387-9D28-4BCA-9A73-D405644BC1C1}"/>
+              </a:ext>
+            </a:extLst>
+          </p:cNvPr>
+          <p:cNvSpPr/>
+          <p:nvPr/>
+        </p:nvSpPr>
+        <p:spPr>
+          <a:xfrm>
+            <a:off x="323272" y="1201946"/>
+            <a:ext cx="1380914" cy="375213"/>
           </a:xfrm>
           <a:prstGeom prst="rect">
             <a:avLst/>
@@ -18247,27 +17461,27 @@
             <a:pPr algn="ctr"/>
             <a:r>
               <a:rPr lang="en-US" sz="1400"/>
-              <a:t>Caregiver ID</a:t>
-            </a:r>
-          </a:p>
-        </p:txBody>
-      </p:sp>
-      <p:sp>
-        <p:nvSpPr>
-          <p:cNvPr id="11" name="Rectangle 10">
-            <a:extLst>
-              <a:ext uri="{FF2B5EF4-FFF2-40B4-BE49-F238E27FC236}">
-                <a16:creationId xmlns:a16="http://schemas.microsoft.com/office/drawing/2014/main" id="{C7FF2387-9D28-4BCA-9A73-D405644BC1C1}"/>
-              </a:ext>
-            </a:extLst>
-          </p:cNvPr>
-          <p:cNvSpPr/>
-          <p:nvPr/>
-        </p:nvSpPr>
-        <p:spPr>
-          <a:xfrm>
-            <a:off x="5631870" y="1200724"/>
-            <a:ext cx="1590966" cy="375213"/>
+              <a:t>Agency</a:t>
+            </a:r>
+          </a:p>
+        </p:txBody>
+      </p:sp>
+      <p:sp>
+        <p:nvSpPr>
+          <p:cNvPr id="12" name="Rectangle 11">
+            <a:extLst>
+              <a:ext uri="{FF2B5EF4-FFF2-40B4-BE49-F238E27FC236}">
+                <a16:creationId xmlns:a16="http://schemas.microsoft.com/office/drawing/2014/main" id="{3CCD1C28-5DF6-44EB-920C-EC57152A0D8B}"/>
+              </a:ext>
+            </a:extLst>
+          </p:cNvPr>
+          <p:cNvSpPr/>
+          <p:nvPr/>
+        </p:nvSpPr>
+        <p:spPr>
+          <a:xfrm>
+            <a:off x="5631868" y="1692300"/>
+            <a:ext cx="1590968" cy="375213"/>
           </a:xfrm>
           <a:prstGeom prst="rect">
             <a:avLst/>
@@ -18294,26 +17508,26 @@
             <a:pPr algn="ctr"/>
             <a:r>
               <a:rPr lang="en-US" sz="1400"/>
-              <a:t>Agency</a:t>
-            </a:r>
-          </a:p>
-        </p:txBody>
-      </p:sp>
-      <p:sp>
-        <p:nvSpPr>
-          <p:cNvPr id="12" name="Rectangle 11">
-            <a:extLst>
-              <a:ext uri="{FF2B5EF4-FFF2-40B4-BE49-F238E27FC236}">
-                <a16:creationId xmlns:a16="http://schemas.microsoft.com/office/drawing/2014/main" id="{3CCD1C28-5DF6-44EB-920C-EC57152A0D8B}"/>
-              </a:ext>
-            </a:extLst>
-          </p:cNvPr>
-          <p:cNvSpPr/>
-          <p:nvPr/>
-        </p:nvSpPr>
-        <p:spPr>
-          <a:xfrm>
-            <a:off x="5631868" y="1692300"/>
+              <a:t>Last name</a:t>
+            </a:r>
+          </a:p>
+        </p:txBody>
+      </p:sp>
+      <p:sp>
+        <p:nvSpPr>
+          <p:cNvPr id="13" name="Rectangle 12">
+            <a:extLst>
+              <a:ext uri="{FF2B5EF4-FFF2-40B4-BE49-F238E27FC236}">
+                <a16:creationId xmlns:a16="http://schemas.microsoft.com/office/drawing/2014/main" id="{868D2B36-8FE5-448A-BDC8-06396EB03A3F}"/>
+              </a:ext>
+            </a:extLst>
+          </p:cNvPr>
+          <p:cNvSpPr/>
+          <p:nvPr/>
+        </p:nvSpPr>
+        <p:spPr>
+          <a:xfrm>
+            <a:off x="5631868" y="2214961"/>
             <a:ext cx="1590968" cy="375213"/>
           </a:xfrm>
           <a:prstGeom prst="rect">
@@ -18341,27 +17555,74 @@
             <a:pPr algn="ctr"/>
             <a:r>
               <a:rPr lang="en-US" sz="1400"/>
-              <a:t>Last name</a:t>
-            </a:r>
-          </a:p>
-        </p:txBody>
-      </p:sp>
-      <p:sp>
-        <p:nvSpPr>
-          <p:cNvPr id="13" name="Rectangle 12">
-            <a:extLst>
-              <a:ext uri="{FF2B5EF4-FFF2-40B4-BE49-F238E27FC236}">
-                <a16:creationId xmlns:a16="http://schemas.microsoft.com/office/drawing/2014/main" id="{868D2B36-8FE5-448A-BDC8-06396EB03A3F}"/>
-              </a:ext>
-            </a:extLst>
-          </p:cNvPr>
-          <p:cNvSpPr/>
-          <p:nvPr/>
-        </p:nvSpPr>
-        <p:spPr>
-          <a:xfrm>
-            <a:off x="5631868" y="2214961"/>
-            <a:ext cx="1590968" cy="375213"/>
+              <a:t>SSN</a:t>
+            </a:r>
+          </a:p>
+        </p:txBody>
+      </p:sp>
+      <p:sp>
+        <p:nvSpPr>
+          <p:cNvPr id="18" name="Rectangle 17">
+            <a:extLst>
+              <a:ext uri="{FF2B5EF4-FFF2-40B4-BE49-F238E27FC236}">
+                <a16:creationId xmlns:a16="http://schemas.microsoft.com/office/drawing/2014/main" id="{CC900875-9094-414F-800C-ED9618E8058F}"/>
+              </a:ext>
+            </a:extLst>
+          </p:cNvPr>
+          <p:cNvSpPr/>
+          <p:nvPr/>
+        </p:nvSpPr>
+        <p:spPr>
+          <a:xfrm>
+            <a:off x="2225964" y="1201947"/>
+            <a:ext cx="1755622" cy="347506"/>
+          </a:xfrm>
+          <a:prstGeom prst="rect">
+            <a:avLst/>
+          </a:prstGeom>
+        </p:spPr>
+        <p:style>
+          <a:lnRef idx="1">
+            <a:schemeClr val="accent3"/>
+          </a:lnRef>
+          <a:fillRef idx="2">
+            <a:schemeClr val="accent3"/>
+          </a:fillRef>
+          <a:effectRef idx="1">
+            <a:schemeClr val="accent3"/>
+          </a:effectRef>
+          <a:fontRef idx="minor">
+            <a:schemeClr val="dk1"/>
+          </a:fontRef>
+        </p:style>
+        <p:txBody>
+          <a:bodyPr rtlCol="0" anchor="ctr"/>
+          <a:lstStyle/>
+          <a:p>
+            <a:pPr algn="ctr"/>
+            <a:r>
+              <a:rPr lang="en-US"/>
+              <a:t>JASA</a:t>
+            </a:r>
+          </a:p>
+        </p:txBody>
+      </p:sp>
+      <p:sp>
+        <p:nvSpPr>
+          <p:cNvPr id="19" name="Rectangle 18">
+            <a:extLst>
+              <a:ext uri="{FF2B5EF4-FFF2-40B4-BE49-F238E27FC236}">
+                <a16:creationId xmlns:a16="http://schemas.microsoft.com/office/drawing/2014/main" id="{CEE1AD42-0C03-495D-8F23-F33499C0A6EF}"/>
+              </a:ext>
+            </a:extLst>
+          </p:cNvPr>
+          <p:cNvSpPr/>
+          <p:nvPr/>
+        </p:nvSpPr>
+        <p:spPr>
+          <a:xfrm>
+            <a:off x="3763825" y="1209449"/>
+            <a:ext cx="267855" cy="332513"/>
           </a:xfrm>
           <a:prstGeom prst="rect">
             <a:avLst/>
@@ -18386,243 +17647,12 @@
           <a:lstStyle/>
           <a:p>
             <a:pPr algn="ctr"/>
-            <a:r>
-              <a:rPr lang="en-US" sz="1400"/>
-              <a:t>SSN</a:t>
-            </a:r>
-          </a:p>
-        </p:txBody>
-      </p:sp>
-      <p:sp>
-        <p:nvSpPr>
-          <p:cNvPr id="15" name="Rectangle 14">
-            <a:extLst>
-              <a:ext uri="{FF2B5EF4-FFF2-40B4-BE49-F238E27FC236}">
-                <a16:creationId xmlns:a16="http://schemas.microsoft.com/office/drawing/2014/main" id="{B17E0830-B6D5-4D53-9249-125783436C6D}"/>
-              </a:ext>
-            </a:extLst>
-          </p:cNvPr>
-          <p:cNvSpPr/>
-          <p:nvPr/>
-        </p:nvSpPr>
-        <p:spPr>
-          <a:xfrm>
-            <a:off x="2235200" y="1237672"/>
-            <a:ext cx="1773382" cy="338266"/>
-          </a:xfrm>
-          <a:prstGeom prst="rect">
-            <a:avLst/>
-          </a:prstGeom>
-        </p:spPr>
-        <p:style>
-          <a:lnRef idx="1">
-            <a:schemeClr val="accent3"/>
-          </a:lnRef>
-          <a:fillRef idx="2">
-            <a:schemeClr val="accent3"/>
-          </a:fillRef>
-          <a:effectRef idx="1">
-            <a:schemeClr val="accent3"/>
-          </a:effectRef>
-          <a:fontRef idx="minor">
-            <a:schemeClr val="dk1"/>
-          </a:fontRef>
-        </p:style>
-        <p:txBody>
-          <a:bodyPr rtlCol="0" anchor="ctr"/>
-          <a:lstStyle/>
-          <a:p>
-            <a:pPr algn="ctr"/>
-            <a:r>
-              <a:rPr lang="en-US"/>
-              <a:t>TL</a:t>
-            </a:r>
-          </a:p>
-        </p:txBody>
-      </p:sp>
-      <p:sp>
-        <p:nvSpPr>
-          <p:cNvPr id="16" name="Rectangle 15">
-            <a:extLst>
-              <a:ext uri="{FF2B5EF4-FFF2-40B4-BE49-F238E27FC236}">
-                <a16:creationId xmlns:a16="http://schemas.microsoft.com/office/drawing/2014/main" id="{80C3F056-1057-49DA-9124-1CD80474C8FD}"/>
-              </a:ext>
-            </a:extLst>
-          </p:cNvPr>
-          <p:cNvSpPr/>
-          <p:nvPr/>
-        </p:nvSpPr>
-        <p:spPr>
-          <a:xfrm>
-            <a:off x="3771901" y="1243952"/>
-            <a:ext cx="227446" cy="338266"/>
-          </a:xfrm>
-          <a:prstGeom prst="rect">
-            <a:avLst/>
-          </a:prstGeom>
-        </p:spPr>
-        <p:style>
-          <a:lnRef idx="2">
-            <a:schemeClr val="accent6"/>
-          </a:lnRef>
-          <a:fillRef idx="1">
-            <a:schemeClr val="lt1"/>
-          </a:fillRef>
-          <a:effectRef idx="0">
-            <a:schemeClr val="accent6"/>
-          </a:effectRef>
-          <a:fontRef idx="minor">
-            <a:schemeClr val="dk1"/>
-          </a:fontRef>
-        </p:style>
-        <p:txBody>
-          <a:bodyPr rtlCol="0" anchor="ctr"/>
-          <a:lstStyle/>
-          <a:p>
-            <a:pPr algn="ctr"/>
             <a:endParaRPr lang="en-US"/>
           </a:p>
         </p:txBody>
       </p:sp>
       <p:sp>
         <p:nvSpPr>
-          <p:cNvPr id="17" name="Flowchart: Merge 16">
-            <a:extLst>
-              <a:ext uri="{FF2B5EF4-FFF2-40B4-BE49-F238E27FC236}">
-                <a16:creationId xmlns:a16="http://schemas.microsoft.com/office/drawing/2014/main" id="{638B81E3-A37F-4BFA-9FD4-7E8A91C2E92E}"/>
-              </a:ext>
-            </a:extLst>
-          </p:cNvPr>
-          <p:cNvSpPr/>
-          <p:nvPr/>
-        </p:nvSpPr>
-        <p:spPr>
-          <a:xfrm>
-            <a:off x="3840480" y="1398271"/>
-            <a:ext cx="127179" cy="103156"/>
-          </a:xfrm>
-          <a:prstGeom prst="flowChartMerge">
-            <a:avLst/>
-          </a:prstGeom>
-        </p:spPr>
-        <p:style>
-          <a:lnRef idx="2">
-            <a:schemeClr val="accent1">
-              <a:shade val="50000"/>
-            </a:schemeClr>
-          </a:lnRef>
-          <a:fillRef idx="1">
-            <a:schemeClr val="accent1"/>
-          </a:fillRef>
-          <a:effectRef idx="0">
-            <a:schemeClr val="accent1"/>
-          </a:effectRef>
-          <a:fontRef idx="minor">
-            <a:schemeClr val="lt1"/>
-          </a:fontRef>
-        </p:style>
-        <p:txBody>
-          <a:bodyPr rtlCol="0" anchor="ctr"/>
-          <a:lstStyle/>
-          <a:p>
-            <a:pPr algn="ctr"/>
-            <a:endParaRPr lang="en-US"/>
-          </a:p>
-        </p:txBody>
-      </p:sp>
-      <p:sp>
-        <p:nvSpPr>
-          <p:cNvPr id="18" name="Rectangle 17">
-            <a:extLst>
-              <a:ext uri="{FF2B5EF4-FFF2-40B4-BE49-F238E27FC236}">
-                <a16:creationId xmlns:a16="http://schemas.microsoft.com/office/drawing/2014/main" id="{CC900875-9094-414F-800C-ED9618E8058F}"/>
-              </a:ext>
-            </a:extLst>
-          </p:cNvPr>
-          <p:cNvSpPr/>
-          <p:nvPr/>
-        </p:nvSpPr>
-        <p:spPr>
-          <a:xfrm>
-            <a:off x="7659256" y="1200725"/>
-            <a:ext cx="1856600" cy="347506"/>
-          </a:xfrm>
-          <a:prstGeom prst="rect">
-            <a:avLst/>
-          </a:prstGeom>
-        </p:spPr>
-        <p:style>
-          <a:lnRef idx="1">
-            <a:schemeClr val="accent3"/>
-          </a:lnRef>
-          <a:fillRef idx="2">
-            <a:schemeClr val="accent3"/>
-          </a:fillRef>
-          <a:effectRef idx="1">
-            <a:schemeClr val="accent3"/>
-          </a:effectRef>
-          <a:fontRef idx="minor">
-            <a:schemeClr val="dk1"/>
-          </a:fontRef>
-        </p:style>
-        <p:txBody>
-          <a:bodyPr rtlCol="0" anchor="ctr"/>
-          <a:lstStyle/>
-          <a:p>
-            <a:pPr algn="ctr"/>
-            <a:r>
-              <a:rPr lang="en-US"/>
-              <a:t>Home Health</a:t>
-            </a:r>
-          </a:p>
-        </p:txBody>
-      </p:sp>
-      <p:sp>
-        <p:nvSpPr>
-          <p:cNvPr id="19" name="Rectangle 18">
-            <a:extLst>
-              <a:ext uri="{FF2B5EF4-FFF2-40B4-BE49-F238E27FC236}">
-                <a16:creationId xmlns:a16="http://schemas.microsoft.com/office/drawing/2014/main" id="{CEE1AD42-0C03-495D-8F23-F33499C0A6EF}"/>
-              </a:ext>
-            </a:extLst>
-          </p:cNvPr>
-          <p:cNvSpPr/>
-          <p:nvPr/>
-        </p:nvSpPr>
-        <p:spPr>
-          <a:xfrm>
-            <a:off x="9238591" y="1200907"/>
-            <a:ext cx="267855" cy="332513"/>
-          </a:xfrm>
-          <a:prstGeom prst="rect">
-            <a:avLst/>
-          </a:prstGeom>
-        </p:spPr>
-        <p:style>
-          <a:lnRef idx="2">
-            <a:schemeClr val="accent6"/>
-          </a:lnRef>
-          <a:fillRef idx="1">
-            <a:schemeClr val="lt1"/>
-          </a:fillRef>
-          <a:effectRef idx="0">
-            <a:schemeClr val="accent6"/>
-          </a:effectRef>
-          <a:fontRef idx="minor">
-            <a:schemeClr val="dk1"/>
-          </a:fontRef>
-        </p:style>
-        <p:txBody>
-          <a:bodyPr rtlCol="0" anchor="ctr"/>
-          <a:lstStyle/>
-          <a:p>
-            <a:pPr algn="ctr"/>
-            <a:endParaRPr lang="en-US"/>
-          </a:p>
-        </p:txBody>
-      </p:sp>
-      <p:sp>
-        <p:nvSpPr>
           <p:cNvPr id="20" name="Flowchart: Merge 19">
             <a:extLst>
               <a:ext uri="{FF2B5EF4-FFF2-40B4-BE49-F238E27FC236}">
@@ -18635,7 +17665,7 @@
         </p:nvSpPr>
         <p:spPr>
           <a:xfrm>
-            <a:off x="9303246" y="1367163"/>
+            <a:off x="3852277" y="1375228"/>
             <a:ext cx="129309" cy="110837"/>
           </a:xfrm>
           <a:prstGeom prst="flowChartMerge">
@@ -19024,7 +18054,7 @@
           <p:nvPr>
             <p:extLst>
               <p:ext uri="{D42A27DB-BD31-4B8C-83A1-F6EECF244321}">
-                <p14:modId xmlns:p14="http://schemas.microsoft.com/office/powerpoint/2010/main" val="116241559"/>
+                <p14:modId xmlns:p14="http://schemas.microsoft.com/office/powerpoint/2010/main" val="1316811778"/>
               </p:ext>
             </p:extLst>
           </p:nvPr>
@@ -19347,7 +18377,10 @@
                     <a:bodyPr/>
                     <a:lstStyle/>
                     <a:p>
-                      <a:endParaRPr lang="en-US" sz="1400"/>
+                      <a:r>
+                        <a:rPr lang="en-US" sz="1400"/>
+                        <a:t>TRUE</a:t>
+                      </a:r>
                     </a:p>
                   </a:txBody>
                   <a:tcPr/>

</xml_diff>